<commit_message>
Video embed html page added by Rohan
</commit_message>
<xml_diff>
--- a/demo/demo2/demo2b.pptx
+++ b/demo/demo2/demo2b.pptx
@@ -1,28 +1,123 @@
 
 <file path=ppt/presentation.xml><?xml version="1.0" encoding="utf-8"?>
-<p:presentation xmlns:a="http://schemas.openxmlformats.org/drawingml/2006/main" xmlns:p="http://schemas.openxmlformats.org/presentationml/2006/main" xmlns:r="http://schemas.openxmlformats.org/officeDocument/2006/relationships" xmlns:p14="http://schemas.microsoft.com/office/powerpoint/2010/main" xmlns:p15="http://schemas.microsoft.com/office/powerpoint/2012/main" xmlns:mc="http://schemas.openxmlformats.org/markup-compatibility/2006">
+<p:presentation xmlns:a="http://schemas.openxmlformats.org/drawingml/2006/main" xmlns:r="http://schemas.openxmlformats.org/officeDocument/2006/relationships" xmlns:p="http://schemas.openxmlformats.org/presentationml/2006/main">
   <p:sldMasterIdLst>
-    <p:sldMasterId id="2147483648" r:id="rId2"/>
+    <p:sldMasterId id="2147483648" r:id="rId1"/>
   </p:sldMasterIdLst>
   <p:sldIdLst>
-    <p:sldId id="256" r:id="rId3"/>
-    <p:sldId id="257" r:id="rId4"/>
-    <p:sldId id="258" r:id="rId5"/>
-    <p:sldId id="259" r:id="rId6"/>
-    <p:sldId id="260" r:id="rId7"/>
-    <p:sldId id="261" r:id="rId8"/>
-    <p:sldId id="262" r:id="rId9"/>
-    <p:sldId id="263" r:id="rId10"/>
-    <p:sldId id="264" r:id="rId11"/>
-    <p:sldId id="265" r:id="rId12"/>
+    <p:sldId id="256" r:id="rId2"/>
+    <p:sldId id="257" r:id="rId3"/>
+    <p:sldId id="258" r:id="rId4"/>
+    <p:sldId id="259" r:id="rId5"/>
+    <p:sldId id="260" r:id="rId6"/>
+    <p:sldId id="261" r:id="rId7"/>
+    <p:sldId id="262" r:id="rId8"/>
+    <p:sldId id="263" r:id="rId9"/>
+    <p:sldId id="264" r:id="rId10"/>
+    <p:sldId id="265" r:id="rId11"/>
   </p:sldIdLst>
   <p:sldSz cx="10080625" cy="7559675"/>
-  <p:notesSz cx="7559675" cy="10691812"/>
+  <p:notesSz cx="7559675" cy="10691813"/>
+  <p:defaultTextStyle>
+    <a:defPPr>
+      <a:defRPr lang="en-US"/>
+    </a:defPPr>
+    <a:lvl1pPr marL="0" algn="l" defTabSz="914400" rtl="0" eaLnBrk="1" latinLnBrk="0" hangingPunct="1">
+      <a:defRPr sz="1800" kern="1200">
+        <a:solidFill>
+          <a:schemeClr val="tx1"/>
+        </a:solidFill>
+        <a:latin typeface="+mn-lt"/>
+        <a:ea typeface="+mn-ea"/>
+        <a:cs typeface="+mn-cs"/>
+      </a:defRPr>
+    </a:lvl1pPr>
+    <a:lvl2pPr marL="457200" algn="l" defTabSz="914400" rtl="0" eaLnBrk="1" latinLnBrk="0" hangingPunct="1">
+      <a:defRPr sz="1800" kern="1200">
+        <a:solidFill>
+          <a:schemeClr val="tx1"/>
+        </a:solidFill>
+        <a:latin typeface="+mn-lt"/>
+        <a:ea typeface="+mn-ea"/>
+        <a:cs typeface="+mn-cs"/>
+      </a:defRPr>
+    </a:lvl2pPr>
+    <a:lvl3pPr marL="914400" algn="l" defTabSz="914400" rtl="0" eaLnBrk="1" latinLnBrk="0" hangingPunct="1">
+      <a:defRPr sz="1800" kern="1200">
+        <a:solidFill>
+          <a:schemeClr val="tx1"/>
+        </a:solidFill>
+        <a:latin typeface="+mn-lt"/>
+        <a:ea typeface="+mn-ea"/>
+        <a:cs typeface="+mn-cs"/>
+      </a:defRPr>
+    </a:lvl3pPr>
+    <a:lvl4pPr marL="1371600" algn="l" defTabSz="914400" rtl="0" eaLnBrk="1" latinLnBrk="0" hangingPunct="1">
+      <a:defRPr sz="1800" kern="1200">
+        <a:solidFill>
+          <a:schemeClr val="tx1"/>
+        </a:solidFill>
+        <a:latin typeface="+mn-lt"/>
+        <a:ea typeface="+mn-ea"/>
+        <a:cs typeface="+mn-cs"/>
+      </a:defRPr>
+    </a:lvl4pPr>
+    <a:lvl5pPr marL="1828800" algn="l" defTabSz="914400" rtl="0" eaLnBrk="1" latinLnBrk="0" hangingPunct="1">
+      <a:defRPr sz="1800" kern="1200">
+        <a:solidFill>
+          <a:schemeClr val="tx1"/>
+        </a:solidFill>
+        <a:latin typeface="+mn-lt"/>
+        <a:ea typeface="+mn-ea"/>
+        <a:cs typeface="+mn-cs"/>
+      </a:defRPr>
+    </a:lvl5pPr>
+    <a:lvl6pPr marL="2286000" algn="l" defTabSz="914400" rtl="0" eaLnBrk="1" latinLnBrk="0" hangingPunct="1">
+      <a:defRPr sz="1800" kern="1200">
+        <a:solidFill>
+          <a:schemeClr val="tx1"/>
+        </a:solidFill>
+        <a:latin typeface="+mn-lt"/>
+        <a:ea typeface="+mn-ea"/>
+        <a:cs typeface="+mn-cs"/>
+      </a:defRPr>
+    </a:lvl6pPr>
+    <a:lvl7pPr marL="2743200" algn="l" defTabSz="914400" rtl="0" eaLnBrk="1" latinLnBrk="0" hangingPunct="1">
+      <a:defRPr sz="1800" kern="1200">
+        <a:solidFill>
+          <a:schemeClr val="tx1"/>
+        </a:solidFill>
+        <a:latin typeface="+mn-lt"/>
+        <a:ea typeface="+mn-ea"/>
+        <a:cs typeface="+mn-cs"/>
+      </a:defRPr>
+    </a:lvl7pPr>
+    <a:lvl8pPr marL="3200400" algn="l" defTabSz="914400" rtl="0" eaLnBrk="1" latinLnBrk="0" hangingPunct="1">
+      <a:defRPr sz="1800" kern="1200">
+        <a:solidFill>
+          <a:schemeClr val="tx1"/>
+        </a:solidFill>
+        <a:latin typeface="+mn-lt"/>
+        <a:ea typeface="+mn-ea"/>
+        <a:cs typeface="+mn-cs"/>
+      </a:defRPr>
+    </a:lvl8pPr>
+    <a:lvl9pPr marL="3657600" algn="l" defTabSz="914400" rtl="0" eaLnBrk="1" latinLnBrk="0" hangingPunct="1">
+      <a:defRPr sz="1800" kern="1200">
+        <a:solidFill>
+          <a:schemeClr val="tx1"/>
+        </a:solidFill>
+        <a:latin typeface="+mn-lt"/>
+        <a:ea typeface="+mn-ea"/>
+        <a:cs typeface="+mn-cs"/>
+      </a:defRPr>
+    </a:lvl9pPr>
+  </p:defaultTextStyle>
 </p:presentation>
 </file>
 
 <file path=ppt/slideLayouts/slideLayout1.xml><?xml version="1.0" encoding="utf-8"?>
-<p:sldLayout xmlns:a="http://schemas.openxmlformats.org/drawingml/2006/main" xmlns:p="http://schemas.openxmlformats.org/presentationml/2006/main" xmlns:r="http://schemas.openxmlformats.org/officeDocument/2006/relationships" xmlns:p14="http://schemas.microsoft.com/office/powerpoint/2010/main" xmlns:p15="http://schemas.microsoft.com/office/powerpoint/2012/main" xmlns:mc="http://schemas.openxmlformats.org/markup-compatibility/2006" type="blank" preserve="1">
+<p:sldLayout xmlns:a="http://schemas.openxmlformats.org/drawingml/2006/main" xmlns:r="http://schemas.openxmlformats.org/officeDocument/2006/relationships" xmlns:p="http://schemas.openxmlformats.org/presentationml/2006/main" type="blank" preserve="1">
   <p:cSld name="Blank Slide">
     <p:spTree>
       <p:nvGrpSpPr>
@@ -40,11 +135,14 @@
       </p:grpSpPr>
     </p:spTree>
   </p:cSld>
+  <p:clrMapOvr>
+    <a:masterClrMapping/>
+  </p:clrMapOvr>
 </p:sldLayout>
 </file>
 
 <file path=ppt/slideLayouts/slideLayout10.xml><?xml version="1.0" encoding="utf-8"?>
-<p:sldLayout xmlns:a="http://schemas.openxmlformats.org/drawingml/2006/main" xmlns:p="http://schemas.openxmlformats.org/presentationml/2006/main" xmlns:r="http://schemas.openxmlformats.org/officeDocument/2006/relationships" xmlns:p14="http://schemas.microsoft.com/office/powerpoint/2010/main" xmlns:p15="http://schemas.microsoft.com/office/powerpoint/2012/main" xmlns:mc="http://schemas.openxmlformats.org/markup-compatibility/2006" type="objOverTx" preserve="1">
+<p:sldLayout xmlns:a="http://schemas.openxmlformats.org/drawingml/2006/main" xmlns:r="http://schemas.openxmlformats.org/officeDocument/2006/relationships" xmlns:p="http://schemas.openxmlformats.org/presentationml/2006/main" type="objOverTx" preserve="1">
   <p:cSld name="Title, Content over Content">
     <p:spTree>
       <p:nvGrpSpPr>
@@ -80,16 +178,17 @@
           </a:prstGeom>
         </p:spPr>
         <p:txBody>
-          <a:bodyPr lIns="0" rIns="0" tIns="0" bIns="0" anchor="ctr"/>
+          <a:bodyPr lIns="0" tIns="0" rIns="0" bIns="0" anchor="ctr"/>
+          <a:lstStyle/>
           <a:p>
             <a:pPr algn="ctr"/>
-            <a:endParaRPr b="0" lang="en-IN" sz="4400" spc="-1" strike="noStrike">
+            <a:endParaRPr lang="en-IN" sz="4400" b="0" strike="noStrike" spc="-1">
               <a:solidFill>
                 <a:srgbClr val="000000"/>
               </a:solidFill>
               <a:uFill>
                 <a:solidFill>
-                  <a:srgbClr val="ffffff"/>
+                  <a:srgbClr val="FFFFFF"/>
                 </a:solidFill>
               </a:uFill>
               <a:latin typeface="Arial"/>
@@ -117,15 +216,16 @@
           </a:prstGeom>
         </p:spPr>
         <p:txBody>
-          <a:bodyPr lIns="0" rIns="0" tIns="0" bIns="0"/>
+          <a:bodyPr lIns="0" tIns="0" rIns="0" bIns="0"/>
+          <a:lstStyle/>
           <a:p>
-            <a:endParaRPr b="0" lang="en-IN" sz="3200" spc="-1" strike="noStrike">
+            <a:endParaRPr lang="en-IN" sz="3200" b="0" strike="noStrike" spc="-1">
               <a:solidFill>
                 <a:srgbClr val="000000"/>
               </a:solidFill>
               <a:uFill>
                 <a:solidFill>
-                  <a:srgbClr val="ffffff"/>
+                  <a:srgbClr val="FFFFFF"/>
                 </a:solidFill>
               </a:uFill>
               <a:latin typeface="Arial"/>
@@ -153,15 +253,16 @@
           </a:prstGeom>
         </p:spPr>
         <p:txBody>
-          <a:bodyPr lIns="0" rIns="0" tIns="0" bIns="0"/>
+          <a:bodyPr lIns="0" tIns="0" rIns="0" bIns="0"/>
+          <a:lstStyle/>
           <a:p>
-            <a:endParaRPr b="0" lang="en-IN" sz="3200" spc="-1" strike="noStrike">
+            <a:endParaRPr lang="en-IN" sz="3200" b="0" strike="noStrike" spc="-1">
               <a:solidFill>
                 <a:srgbClr val="000000"/>
               </a:solidFill>
               <a:uFill>
                 <a:solidFill>
-                  <a:srgbClr val="ffffff"/>
+                  <a:srgbClr val="FFFFFF"/>
                 </a:solidFill>
               </a:uFill>
               <a:latin typeface="Arial"/>
@@ -171,11 +272,14 @@
       </p:sp>
     </p:spTree>
   </p:cSld>
+  <p:clrMapOvr>
+    <a:masterClrMapping/>
+  </p:clrMapOvr>
 </p:sldLayout>
 </file>
 
 <file path=ppt/slideLayouts/slideLayout11.xml><?xml version="1.0" encoding="utf-8"?>
-<p:sldLayout xmlns:a="http://schemas.openxmlformats.org/drawingml/2006/main" xmlns:p="http://schemas.openxmlformats.org/presentationml/2006/main" xmlns:r="http://schemas.openxmlformats.org/officeDocument/2006/relationships" xmlns:p14="http://schemas.microsoft.com/office/powerpoint/2010/main" xmlns:p15="http://schemas.microsoft.com/office/powerpoint/2012/main" xmlns:mc="http://schemas.openxmlformats.org/markup-compatibility/2006" type="fourObj" preserve="1">
+<p:sldLayout xmlns:a="http://schemas.openxmlformats.org/drawingml/2006/main" xmlns:r="http://schemas.openxmlformats.org/officeDocument/2006/relationships" xmlns:p="http://schemas.openxmlformats.org/presentationml/2006/main" type="fourObj" preserve="1">
   <p:cSld name="Title, 4 Content">
     <p:spTree>
       <p:nvGrpSpPr>
@@ -211,16 +315,17 @@
           </a:prstGeom>
         </p:spPr>
         <p:txBody>
-          <a:bodyPr lIns="0" rIns="0" tIns="0" bIns="0" anchor="ctr"/>
+          <a:bodyPr lIns="0" tIns="0" rIns="0" bIns="0" anchor="ctr"/>
+          <a:lstStyle/>
           <a:p>
             <a:pPr algn="ctr"/>
-            <a:endParaRPr b="0" lang="en-IN" sz="4400" spc="-1" strike="noStrike">
+            <a:endParaRPr lang="en-IN" sz="4400" b="0" strike="noStrike" spc="-1">
               <a:solidFill>
                 <a:srgbClr val="000000"/>
               </a:solidFill>
               <a:uFill>
                 <a:solidFill>
-                  <a:srgbClr val="ffffff"/>
+                  <a:srgbClr val="FFFFFF"/>
                 </a:solidFill>
               </a:uFill>
               <a:latin typeface="Arial"/>
@@ -248,15 +353,16 @@
           </a:prstGeom>
         </p:spPr>
         <p:txBody>
-          <a:bodyPr lIns="0" rIns="0" tIns="0" bIns="0"/>
+          <a:bodyPr lIns="0" tIns="0" rIns="0" bIns="0"/>
+          <a:lstStyle/>
           <a:p>
-            <a:endParaRPr b="0" lang="en-IN" sz="3200" spc="-1" strike="noStrike">
+            <a:endParaRPr lang="en-IN" sz="3200" b="0" strike="noStrike" spc="-1">
               <a:solidFill>
                 <a:srgbClr val="000000"/>
               </a:solidFill>
               <a:uFill>
                 <a:solidFill>
-                  <a:srgbClr val="ffffff"/>
+                  <a:srgbClr val="FFFFFF"/>
                 </a:solidFill>
               </a:uFill>
               <a:latin typeface="Arial"/>
@@ -284,15 +390,16 @@
           </a:prstGeom>
         </p:spPr>
         <p:txBody>
-          <a:bodyPr lIns="0" rIns="0" tIns="0" bIns="0"/>
+          <a:bodyPr lIns="0" tIns="0" rIns="0" bIns="0"/>
+          <a:lstStyle/>
           <a:p>
-            <a:endParaRPr b="0" lang="en-IN" sz="3200" spc="-1" strike="noStrike">
+            <a:endParaRPr lang="en-IN" sz="3200" b="0" strike="noStrike" spc="-1">
               <a:solidFill>
                 <a:srgbClr val="000000"/>
               </a:solidFill>
               <a:uFill>
                 <a:solidFill>
-                  <a:srgbClr val="ffffff"/>
+                  <a:srgbClr val="FFFFFF"/>
                 </a:solidFill>
               </a:uFill>
               <a:latin typeface="Arial"/>
@@ -320,15 +427,16 @@
           </a:prstGeom>
         </p:spPr>
         <p:txBody>
-          <a:bodyPr lIns="0" rIns="0" tIns="0" bIns="0"/>
+          <a:bodyPr lIns="0" tIns="0" rIns="0" bIns="0"/>
+          <a:lstStyle/>
           <a:p>
-            <a:endParaRPr b="0" lang="en-IN" sz="3200" spc="-1" strike="noStrike">
+            <a:endParaRPr lang="en-IN" sz="3200" b="0" strike="noStrike" spc="-1">
               <a:solidFill>
                 <a:srgbClr val="000000"/>
               </a:solidFill>
               <a:uFill>
                 <a:solidFill>
-                  <a:srgbClr val="ffffff"/>
+                  <a:srgbClr val="FFFFFF"/>
                 </a:solidFill>
               </a:uFill>
               <a:latin typeface="Arial"/>
@@ -356,15 +464,16 @@
           </a:prstGeom>
         </p:spPr>
         <p:txBody>
-          <a:bodyPr lIns="0" rIns="0" tIns="0" bIns="0"/>
+          <a:bodyPr lIns="0" tIns="0" rIns="0" bIns="0"/>
+          <a:lstStyle/>
           <a:p>
-            <a:endParaRPr b="0" lang="en-IN" sz="3200" spc="-1" strike="noStrike">
+            <a:endParaRPr lang="en-IN" sz="3200" b="0" strike="noStrike" spc="-1">
               <a:solidFill>
                 <a:srgbClr val="000000"/>
               </a:solidFill>
               <a:uFill>
                 <a:solidFill>
-                  <a:srgbClr val="ffffff"/>
+                  <a:srgbClr val="FFFFFF"/>
                 </a:solidFill>
               </a:uFill>
               <a:latin typeface="Arial"/>
@@ -374,11 +483,14 @@
       </p:sp>
     </p:spTree>
   </p:cSld>
+  <p:clrMapOvr>
+    <a:masterClrMapping/>
+  </p:clrMapOvr>
 </p:sldLayout>
 </file>
 
 <file path=ppt/slideLayouts/slideLayout12.xml><?xml version="1.0" encoding="utf-8"?>
-<p:sldLayout xmlns:a="http://schemas.openxmlformats.org/drawingml/2006/main" xmlns:p="http://schemas.openxmlformats.org/presentationml/2006/main" xmlns:r="http://schemas.openxmlformats.org/officeDocument/2006/relationships" xmlns:p14="http://schemas.microsoft.com/office/powerpoint/2010/main" xmlns:p15="http://schemas.microsoft.com/office/powerpoint/2012/main" xmlns:mc="http://schemas.openxmlformats.org/markup-compatibility/2006" type="blank" preserve="1">
+<p:sldLayout xmlns:a="http://schemas.openxmlformats.org/drawingml/2006/main" xmlns:r="http://schemas.openxmlformats.org/officeDocument/2006/relationships" xmlns:p="http://schemas.openxmlformats.org/presentationml/2006/main" type="blank" preserve="1">
   <p:cSld name="Title, 6 Content">
     <p:spTree>
       <p:nvGrpSpPr>
@@ -414,16 +526,17 @@
           </a:prstGeom>
         </p:spPr>
         <p:txBody>
-          <a:bodyPr lIns="0" rIns="0" tIns="0" bIns="0" anchor="ctr"/>
+          <a:bodyPr lIns="0" tIns="0" rIns="0" bIns="0" anchor="ctr"/>
+          <a:lstStyle/>
           <a:p>
             <a:pPr algn="ctr"/>
-            <a:endParaRPr b="0" lang="en-IN" sz="4400" spc="-1" strike="noStrike">
+            <a:endParaRPr lang="en-IN" sz="4400" b="0" strike="noStrike" spc="-1">
               <a:solidFill>
                 <a:srgbClr val="000000"/>
               </a:solidFill>
               <a:uFill>
                 <a:solidFill>
-                  <a:srgbClr val="ffffff"/>
+                  <a:srgbClr val="FFFFFF"/>
                 </a:solidFill>
               </a:uFill>
               <a:latin typeface="Arial"/>
@@ -451,15 +564,16 @@
           </a:prstGeom>
         </p:spPr>
         <p:txBody>
-          <a:bodyPr lIns="0" rIns="0" tIns="0" bIns="0"/>
+          <a:bodyPr lIns="0" tIns="0" rIns="0" bIns="0"/>
+          <a:lstStyle/>
           <a:p>
-            <a:endParaRPr b="0" lang="en-IN" sz="3200" spc="-1" strike="noStrike">
+            <a:endParaRPr lang="en-IN" sz="3200" b="0" strike="noStrike" spc="-1">
               <a:solidFill>
                 <a:srgbClr val="000000"/>
               </a:solidFill>
               <a:uFill>
                 <a:solidFill>
-                  <a:srgbClr val="ffffff"/>
+                  <a:srgbClr val="FFFFFF"/>
                 </a:solidFill>
               </a:uFill>
               <a:latin typeface="Arial"/>
@@ -487,15 +601,16 @@
           </a:prstGeom>
         </p:spPr>
         <p:txBody>
-          <a:bodyPr lIns="0" rIns="0" tIns="0" bIns="0"/>
+          <a:bodyPr lIns="0" tIns="0" rIns="0" bIns="0"/>
+          <a:lstStyle/>
           <a:p>
-            <a:endParaRPr b="0" lang="en-IN" sz="3200" spc="-1" strike="noStrike">
+            <a:endParaRPr lang="en-IN" sz="3200" b="0" strike="noStrike" spc="-1">
               <a:solidFill>
                 <a:srgbClr val="000000"/>
               </a:solidFill>
               <a:uFill>
                 <a:solidFill>
-                  <a:srgbClr val="ffffff"/>
+                  <a:srgbClr val="FFFFFF"/>
                 </a:solidFill>
               </a:uFill>
               <a:latin typeface="Arial"/>
@@ -505,7 +620,7 @@
       </p:sp>
       <p:pic>
         <p:nvPicPr>
-          <p:cNvPr id="37" name="" descr=""/>
+          <p:cNvPr id="37" name="Picture 36"/>
           <p:cNvPicPr/>
           <p:nvPr/>
         </p:nvPicPr>
@@ -528,12 +643,12 @@
       </p:pic>
       <p:pic>
         <p:nvPicPr>
-          <p:cNvPr id="38" name="" descr=""/>
+          <p:cNvPr id="38" name="Picture 37"/>
           <p:cNvPicPr/>
           <p:nvPr/>
         </p:nvPicPr>
         <p:blipFill>
-          <a:blip r:embed="rId3"/>
+          <a:blip r:embed="rId2"/>
           <a:stretch/>
         </p:blipFill>
         <p:spPr>
@@ -551,11 +666,14 @@
       </p:pic>
     </p:spTree>
   </p:cSld>
+  <p:clrMapOvr>
+    <a:masterClrMapping/>
+  </p:clrMapOvr>
 </p:sldLayout>
 </file>
 
 <file path=ppt/slideLayouts/slideLayout2.xml><?xml version="1.0" encoding="utf-8"?>
-<p:sldLayout xmlns:a="http://schemas.openxmlformats.org/drawingml/2006/main" xmlns:p="http://schemas.openxmlformats.org/presentationml/2006/main" xmlns:r="http://schemas.openxmlformats.org/officeDocument/2006/relationships" xmlns:p14="http://schemas.microsoft.com/office/powerpoint/2010/main" xmlns:p15="http://schemas.microsoft.com/office/powerpoint/2012/main" xmlns:mc="http://schemas.openxmlformats.org/markup-compatibility/2006" type="tx" preserve="1">
+<p:sldLayout xmlns:a="http://schemas.openxmlformats.org/drawingml/2006/main" xmlns:r="http://schemas.openxmlformats.org/officeDocument/2006/relationships" xmlns:p="http://schemas.openxmlformats.org/presentationml/2006/main" type="tx" preserve="1">
   <p:cSld name="Title Slide">
     <p:spTree>
       <p:nvGrpSpPr>
@@ -591,16 +709,17 @@
           </a:prstGeom>
         </p:spPr>
         <p:txBody>
-          <a:bodyPr lIns="0" rIns="0" tIns="0" bIns="0" anchor="ctr"/>
+          <a:bodyPr lIns="0" tIns="0" rIns="0" bIns="0" anchor="ctr"/>
+          <a:lstStyle/>
           <a:p>
             <a:pPr algn="ctr"/>
-            <a:endParaRPr b="0" lang="en-IN" sz="4400" spc="-1" strike="noStrike">
+            <a:endParaRPr lang="en-IN" sz="4400" b="0" strike="noStrike" spc="-1">
               <a:solidFill>
                 <a:srgbClr val="000000"/>
               </a:solidFill>
               <a:uFill>
                 <a:solidFill>
-                  <a:srgbClr val="ffffff"/>
+                  <a:srgbClr val="FFFFFF"/>
                 </a:solidFill>
               </a:uFill>
               <a:latin typeface="Arial"/>
@@ -628,16 +747,17 @@
           </a:prstGeom>
         </p:spPr>
         <p:txBody>
-          <a:bodyPr lIns="0" rIns="0" tIns="0" bIns="0" anchor="ctr"/>
+          <a:bodyPr lIns="0" tIns="0" rIns="0" bIns="0" anchor="ctr"/>
+          <a:lstStyle/>
           <a:p>
             <a:pPr algn="ctr"/>
-            <a:endParaRPr b="0" lang="en-IN" sz="3200" spc="-1" strike="noStrike">
+            <a:endParaRPr lang="en-IN" sz="3200" b="0" strike="noStrike" spc="-1">
               <a:solidFill>
                 <a:srgbClr val="000000"/>
               </a:solidFill>
               <a:uFill>
                 <a:solidFill>
-                  <a:srgbClr val="ffffff"/>
+                  <a:srgbClr val="FFFFFF"/>
                 </a:solidFill>
               </a:uFill>
               <a:latin typeface="Arial"/>
@@ -647,11 +767,14 @@
       </p:sp>
     </p:spTree>
   </p:cSld>
+  <p:clrMapOvr>
+    <a:masterClrMapping/>
+  </p:clrMapOvr>
 </p:sldLayout>
 </file>
 
 <file path=ppt/slideLayouts/slideLayout3.xml><?xml version="1.0" encoding="utf-8"?>
-<p:sldLayout xmlns:a="http://schemas.openxmlformats.org/drawingml/2006/main" xmlns:p="http://schemas.openxmlformats.org/presentationml/2006/main" xmlns:r="http://schemas.openxmlformats.org/officeDocument/2006/relationships" xmlns:p14="http://schemas.microsoft.com/office/powerpoint/2010/main" xmlns:p15="http://schemas.microsoft.com/office/powerpoint/2012/main" xmlns:mc="http://schemas.openxmlformats.org/markup-compatibility/2006" type="obj" preserve="1">
+<p:sldLayout xmlns:a="http://schemas.openxmlformats.org/drawingml/2006/main" xmlns:r="http://schemas.openxmlformats.org/officeDocument/2006/relationships" xmlns:p="http://schemas.openxmlformats.org/presentationml/2006/main" type="obj" preserve="1">
   <p:cSld name="Title, Content">
     <p:spTree>
       <p:nvGrpSpPr>
@@ -687,16 +810,17 @@
           </a:prstGeom>
         </p:spPr>
         <p:txBody>
-          <a:bodyPr lIns="0" rIns="0" tIns="0" bIns="0" anchor="ctr"/>
+          <a:bodyPr lIns="0" tIns="0" rIns="0" bIns="0" anchor="ctr"/>
+          <a:lstStyle/>
           <a:p>
             <a:pPr algn="ctr"/>
-            <a:endParaRPr b="0" lang="en-IN" sz="4400" spc="-1" strike="noStrike">
+            <a:endParaRPr lang="en-IN" sz="4400" b="0" strike="noStrike" spc="-1">
               <a:solidFill>
                 <a:srgbClr val="000000"/>
               </a:solidFill>
               <a:uFill>
                 <a:solidFill>
-                  <a:srgbClr val="ffffff"/>
+                  <a:srgbClr val="FFFFFF"/>
                 </a:solidFill>
               </a:uFill>
               <a:latin typeface="Arial"/>
@@ -724,15 +848,16 @@
           </a:prstGeom>
         </p:spPr>
         <p:txBody>
-          <a:bodyPr lIns="0" rIns="0" tIns="0" bIns="0"/>
+          <a:bodyPr lIns="0" tIns="0" rIns="0" bIns="0"/>
+          <a:lstStyle/>
           <a:p>
-            <a:endParaRPr b="0" lang="en-IN" sz="3200" spc="-1" strike="noStrike">
+            <a:endParaRPr lang="en-IN" sz="3200" b="0" strike="noStrike" spc="-1">
               <a:solidFill>
                 <a:srgbClr val="000000"/>
               </a:solidFill>
               <a:uFill>
                 <a:solidFill>
-                  <a:srgbClr val="ffffff"/>
+                  <a:srgbClr val="FFFFFF"/>
                 </a:solidFill>
               </a:uFill>
               <a:latin typeface="Arial"/>
@@ -742,11 +867,14 @@
       </p:sp>
     </p:spTree>
   </p:cSld>
+  <p:clrMapOvr>
+    <a:masterClrMapping/>
+  </p:clrMapOvr>
 </p:sldLayout>
 </file>
 
 <file path=ppt/slideLayouts/slideLayout4.xml><?xml version="1.0" encoding="utf-8"?>
-<p:sldLayout xmlns:a="http://schemas.openxmlformats.org/drawingml/2006/main" xmlns:p="http://schemas.openxmlformats.org/presentationml/2006/main" xmlns:r="http://schemas.openxmlformats.org/officeDocument/2006/relationships" xmlns:p14="http://schemas.microsoft.com/office/powerpoint/2010/main" xmlns:p15="http://schemas.microsoft.com/office/powerpoint/2012/main" xmlns:mc="http://schemas.openxmlformats.org/markup-compatibility/2006" type="twoObj" preserve="1">
+<p:sldLayout xmlns:a="http://schemas.openxmlformats.org/drawingml/2006/main" xmlns:r="http://schemas.openxmlformats.org/officeDocument/2006/relationships" xmlns:p="http://schemas.openxmlformats.org/presentationml/2006/main" type="twoObj" preserve="1">
   <p:cSld name="Title, 2 Content">
     <p:spTree>
       <p:nvGrpSpPr>
@@ -782,16 +910,17 @@
           </a:prstGeom>
         </p:spPr>
         <p:txBody>
-          <a:bodyPr lIns="0" rIns="0" tIns="0" bIns="0" anchor="ctr"/>
+          <a:bodyPr lIns="0" tIns="0" rIns="0" bIns="0" anchor="ctr"/>
+          <a:lstStyle/>
           <a:p>
             <a:pPr algn="ctr"/>
-            <a:endParaRPr b="0" lang="en-IN" sz="4400" spc="-1" strike="noStrike">
+            <a:endParaRPr lang="en-IN" sz="4400" b="0" strike="noStrike" spc="-1">
               <a:solidFill>
                 <a:srgbClr val="000000"/>
               </a:solidFill>
               <a:uFill>
                 <a:solidFill>
-                  <a:srgbClr val="ffffff"/>
+                  <a:srgbClr val="FFFFFF"/>
                 </a:solidFill>
               </a:uFill>
               <a:latin typeface="Arial"/>
@@ -819,15 +948,16 @@
           </a:prstGeom>
         </p:spPr>
         <p:txBody>
-          <a:bodyPr lIns="0" rIns="0" tIns="0" bIns="0"/>
+          <a:bodyPr lIns="0" tIns="0" rIns="0" bIns="0"/>
+          <a:lstStyle/>
           <a:p>
-            <a:endParaRPr b="0" lang="en-IN" sz="3200" spc="-1" strike="noStrike">
+            <a:endParaRPr lang="en-IN" sz="3200" b="0" strike="noStrike" spc="-1">
               <a:solidFill>
                 <a:srgbClr val="000000"/>
               </a:solidFill>
               <a:uFill>
                 <a:solidFill>
-                  <a:srgbClr val="ffffff"/>
+                  <a:srgbClr val="FFFFFF"/>
                 </a:solidFill>
               </a:uFill>
               <a:latin typeface="Arial"/>
@@ -855,15 +985,16 @@
           </a:prstGeom>
         </p:spPr>
         <p:txBody>
-          <a:bodyPr lIns="0" rIns="0" tIns="0" bIns="0"/>
+          <a:bodyPr lIns="0" tIns="0" rIns="0" bIns="0"/>
+          <a:lstStyle/>
           <a:p>
-            <a:endParaRPr b="0" lang="en-IN" sz="3200" spc="-1" strike="noStrike">
+            <a:endParaRPr lang="en-IN" sz="3200" b="0" strike="noStrike" spc="-1">
               <a:solidFill>
                 <a:srgbClr val="000000"/>
               </a:solidFill>
               <a:uFill>
                 <a:solidFill>
-                  <a:srgbClr val="ffffff"/>
+                  <a:srgbClr val="FFFFFF"/>
                 </a:solidFill>
               </a:uFill>
               <a:latin typeface="Arial"/>
@@ -873,11 +1004,14 @@
       </p:sp>
     </p:spTree>
   </p:cSld>
+  <p:clrMapOvr>
+    <a:masterClrMapping/>
+  </p:clrMapOvr>
 </p:sldLayout>
 </file>
 
 <file path=ppt/slideLayouts/slideLayout5.xml><?xml version="1.0" encoding="utf-8"?>
-<p:sldLayout xmlns:a="http://schemas.openxmlformats.org/drawingml/2006/main" xmlns:p="http://schemas.openxmlformats.org/presentationml/2006/main" xmlns:r="http://schemas.openxmlformats.org/officeDocument/2006/relationships" xmlns:p14="http://schemas.microsoft.com/office/powerpoint/2010/main" xmlns:p15="http://schemas.microsoft.com/office/powerpoint/2012/main" xmlns:mc="http://schemas.openxmlformats.org/markup-compatibility/2006" type="titleOnly" preserve="1">
+<p:sldLayout xmlns:a="http://schemas.openxmlformats.org/drawingml/2006/main" xmlns:r="http://schemas.openxmlformats.org/officeDocument/2006/relationships" xmlns:p="http://schemas.openxmlformats.org/presentationml/2006/main" type="titleOnly" preserve="1">
   <p:cSld name="Title Only">
     <p:spTree>
       <p:nvGrpSpPr>
@@ -913,16 +1047,17 @@
           </a:prstGeom>
         </p:spPr>
         <p:txBody>
-          <a:bodyPr lIns="0" rIns="0" tIns="0" bIns="0" anchor="ctr"/>
+          <a:bodyPr lIns="0" tIns="0" rIns="0" bIns="0" anchor="ctr"/>
+          <a:lstStyle/>
           <a:p>
             <a:pPr algn="ctr"/>
-            <a:endParaRPr b="0" lang="en-IN" sz="4400" spc="-1" strike="noStrike">
+            <a:endParaRPr lang="en-IN" sz="4400" b="0" strike="noStrike" spc="-1">
               <a:solidFill>
                 <a:srgbClr val="000000"/>
               </a:solidFill>
               <a:uFill>
                 <a:solidFill>
-                  <a:srgbClr val="ffffff"/>
+                  <a:srgbClr val="FFFFFF"/>
                 </a:solidFill>
               </a:uFill>
               <a:latin typeface="Arial"/>
@@ -932,11 +1067,14 @@
       </p:sp>
     </p:spTree>
   </p:cSld>
+  <p:clrMapOvr>
+    <a:masterClrMapping/>
+  </p:clrMapOvr>
 </p:sldLayout>
 </file>
 
 <file path=ppt/slideLayouts/slideLayout6.xml><?xml version="1.0" encoding="utf-8"?>
-<p:sldLayout xmlns:a="http://schemas.openxmlformats.org/drawingml/2006/main" xmlns:p="http://schemas.openxmlformats.org/presentationml/2006/main" xmlns:r="http://schemas.openxmlformats.org/officeDocument/2006/relationships" xmlns:p14="http://schemas.microsoft.com/office/powerpoint/2010/main" xmlns:p15="http://schemas.microsoft.com/office/powerpoint/2012/main" xmlns:mc="http://schemas.openxmlformats.org/markup-compatibility/2006" type="objOnly" preserve="1">
+<p:sldLayout xmlns:a="http://schemas.openxmlformats.org/drawingml/2006/main" xmlns:r="http://schemas.openxmlformats.org/officeDocument/2006/relationships" xmlns:p="http://schemas.openxmlformats.org/presentationml/2006/main" type="objOnly" preserve="1">
   <p:cSld name="Centered Text">
     <p:spTree>
       <p:nvGrpSpPr>
@@ -972,16 +1110,17 @@
           </a:prstGeom>
         </p:spPr>
         <p:txBody>
-          <a:bodyPr lIns="0" rIns="0" tIns="0" bIns="0" anchor="ctr"/>
+          <a:bodyPr lIns="0" tIns="0" rIns="0" bIns="0" anchor="ctr"/>
+          <a:lstStyle/>
           <a:p>
             <a:pPr algn="ctr"/>
-            <a:endParaRPr b="0" lang="en-IN" sz="3200" spc="-1" strike="noStrike">
+            <a:endParaRPr lang="en-IN" sz="3200" b="0" strike="noStrike" spc="-1">
               <a:solidFill>
                 <a:srgbClr val="000000"/>
               </a:solidFill>
               <a:uFill>
                 <a:solidFill>
-                  <a:srgbClr val="ffffff"/>
+                  <a:srgbClr val="FFFFFF"/>
                 </a:solidFill>
               </a:uFill>
               <a:latin typeface="Arial"/>
@@ -991,11 +1130,14 @@
       </p:sp>
     </p:spTree>
   </p:cSld>
+  <p:clrMapOvr>
+    <a:masterClrMapping/>
+  </p:clrMapOvr>
 </p:sldLayout>
 </file>
 
 <file path=ppt/slideLayouts/slideLayout7.xml><?xml version="1.0" encoding="utf-8"?>
-<p:sldLayout xmlns:a="http://schemas.openxmlformats.org/drawingml/2006/main" xmlns:p="http://schemas.openxmlformats.org/presentationml/2006/main" xmlns:r="http://schemas.openxmlformats.org/officeDocument/2006/relationships" xmlns:p14="http://schemas.microsoft.com/office/powerpoint/2010/main" xmlns:p15="http://schemas.microsoft.com/office/powerpoint/2012/main" xmlns:mc="http://schemas.openxmlformats.org/markup-compatibility/2006" type="twoObjAndObj" preserve="1">
+<p:sldLayout xmlns:a="http://schemas.openxmlformats.org/drawingml/2006/main" xmlns:r="http://schemas.openxmlformats.org/officeDocument/2006/relationships" xmlns:p="http://schemas.openxmlformats.org/presentationml/2006/main" type="twoObjAndObj" preserve="1">
   <p:cSld name="Title, 2 Content and Content">
     <p:spTree>
       <p:nvGrpSpPr>
@@ -1031,16 +1173,17 @@
           </a:prstGeom>
         </p:spPr>
         <p:txBody>
-          <a:bodyPr lIns="0" rIns="0" tIns="0" bIns="0" anchor="ctr"/>
+          <a:bodyPr lIns="0" tIns="0" rIns="0" bIns="0" anchor="ctr"/>
+          <a:lstStyle/>
           <a:p>
             <a:pPr algn="ctr"/>
-            <a:endParaRPr b="0" lang="en-IN" sz="4400" spc="-1" strike="noStrike">
+            <a:endParaRPr lang="en-IN" sz="4400" b="0" strike="noStrike" spc="-1">
               <a:solidFill>
                 <a:srgbClr val="000000"/>
               </a:solidFill>
               <a:uFill>
                 <a:solidFill>
-                  <a:srgbClr val="ffffff"/>
+                  <a:srgbClr val="FFFFFF"/>
                 </a:solidFill>
               </a:uFill>
               <a:latin typeface="Arial"/>
@@ -1068,15 +1211,16 @@
           </a:prstGeom>
         </p:spPr>
         <p:txBody>
-          <a:bodyPr lIns="0" rIns="0" tIns="0" bIns="0"/>
+          <a:bodyPr lIns="0" tIns="0" rIns="0" bIns="0"/>
+          <a:lstStyle/>
           <a:p>
-            <a:endParaRPr b="0" lang="en-IN" sz="3200" spc="-1" strike="noStrike">
+            <a:endParaRPr lang="en-IN" sz="3200" b="0" strike="noStrike" spc="-1">
               <a:solidFill>
                 <a:srgbClr val="000000"/>
               </a:solidFill>
               <a:uFill>
                 <a:solidFill>
-                  <a:srgbClr val="ffffff"/>
+                  <a:srgbClr val="FFFFFF"/>
                 </a:solidFill>
               </a:uFill>
               <a:latin typeface="Arial"/>
@@ -1104,15 +1248,16 @@
           </a:prstGeom>
         </p:spPr>
         <p:txBody>
-          <a:bodyPr lIns="0" rIns="0" tIns="0" bIns="0"/>
+          <a:bodyPr lIns="0" tIns="0" rIns="0" bIns="0"/>
+          <a:lstStyle/>
           <a:p>
-            <a:endParaRPr b="0" lang="en-IN" sz="3200" spc="-1" strike="noStrike">
+            <a:endParaRPr lang="en-IN" sz="3200" b="0" strike="noStrike" spc="-1">
               <a:solidFill>
                 <a:srgbClr val="000000"/>
               </a:solidFill>
               <a:uFill>
                 <a:solidFill>
-                  <a:srgbClr val="ffffff"/>
+                  <a:srgbClr val="FFFFFF"/>
                 </a:solidFill>
               </a:uFill>
               <a:latin typeface="Arial"/>
@@ -1140,15 +1285,16 @@
           </a:prstGeom>
         </p:spPr>
         <p:txBody>
-          <a:bodyPr lIns="0" rIns="0" tIns="0" bIns="0"/>
+          <a:bodyPr lIns="0" tIns="0" rIns="0" bIns="0"/>
+          <a:lstStyle/>
           <a:p>
-            <a:endParaRPr b="0" lang="en-IN" sz="3200" spc="-1" strike="noStrike">
+            <a:endParaRPr lang="en-IN" sz="3200" b="0" strike="noStrike" spc="-1">
               <a:solidFill>
                 <a:srgbClr val="000000"/>
               </a:solidFill>
               <a:uFill>
                 <a:solidFill>
-                  <a:srgbClr val="ffffff"/>
+                  <a:srgbClr val="FFFFFF"/>
                 </a:solidFill>
               </a:uFill>
               <a:latin typeface="Arial"/>
@@ -1158,11 +1304,14 @@
       </p:sp>
     </p:spTree>
   </p:cSld>
+  <p:clrMapOvr>
+    <a:masterClrMapping/>
+  </p:clrMapOvr>
 </p:sldLayout>
 </file>
 
 <file path=ppt/slideLayouts/slideLayout8.xml><?xml version="1.0" encoding="utf-8"?>
-<p:sldLayout xmlns:a="http://schemas.openxmlformats.org/drawingml/2006/main" xmlns:p="http://schemas.openxmlformats.org/presentationml/2006/main" xmlns:r="http://schemas.openxmlformats.org/officeDocument/2006/relationships" xmlns:p14="http://schemas.microsoft.com/office/powerpoint/2010/main" xmlns:p15="http://schemas.microsoft.com/office/powerpoint/2012/main" xmlns:mc="http://schemas.openxmlformats.org/markup-compatibility/2006" type="objAndTwoObj" preserve="1">
+<p:sldLayout xmlns:a="http://schemas.openxmlformats.org/drawingml/2006/main" xmlns:r="http://schemas.openxmlformats.org/officeDocument/2006/relationships" xmlns:p="http://schemas.openxmlformats.org/presentationml/2006/main" type="objAndTwoObj" preserve="1">
   <p:cSld name="Title Content and 2 Content">
     <p:spTree>
       <p:nvGrpSpPr>
@@ -1198,16 +1347,17 @@
           </a:prstGeom>
         </p:spPr>
         <p:txBody>
-          <a:bodyPr lIns="0" rIns="0" tIns="0" bIns="0" anchor="ctr"/>
+          <a:bodyPr lIns="0" tIns="0" rIns="0" bIns="0" anchor="ctr"/>
+          <a:lstStyle/>
           <a:p>
             <a:pPr algn="ctr"/>
-            <a:endParaRPr b="0" lang="en-IN" sz="4400" spc="-1" strike="noStrike">
+            <a:endParaRPr lang="en-IN" sz="4400" b="0" strike="noStrike" spc="-1">
               <a:solidFill>
                 <a:srgbClr val="000000"/>
               </a:solidFill>
               <a:uFill>
                 <a:solidFill>
-                  <a:srgbClr val="ffffff"/>
+                  <a:srgbClr val="FFFFFF"/>
                 </a:solidFill>
               </a:uFill>
               <a:latin typeface="Arial"/>
@@ -1235,15 +1385,16 @@
           </a:prstGeom>
         </p:spPr>
         <p:txBody>
-          <a:bodyPr lIns="0" rIns="0" tIns="0" bIns="0"/>
+          <a:bodyPr lIns="0" tIns="0" rIns="0" bIns="0"/>
+          <a:lstStyle/>
           <a:p>
-            <a:endParaRPr b="0" lang="en-IN" sz="3200" spc="-1" strike="noStrike">
+            <a:endParaRPr lang="en-IN" sz="3200" b="0" strike="noStrike" spc="-1">
               <a:solidFill>
                 <a:srgbClr val="000000"/>
               </a:solidFill>
               <a:uFill>
                 <a:solidFill>
-                  <a:srgbClr val="ffffff"/>
+                  <a:srgbClr val="FFFFFF"/>
                 </a:solidFill>
               </a:uFill>
               <a:latin typeface="Arial"/>
@@ -1271,15 +1422,16 @@
           </a:prstGeom>
         </p:spPr>
         <p:txBody>
-          <a:bodyPr lIns="0" rIns="0" tIns="0" bIns="0"/>
+          <a:bodyPr lIns="0" tIns="0" rIns="0" bIns="0"/>
+          <a:lstStyle/>
           <a:p>
-            <a:endParaRPr b="0" lang="en-IN" sz="3200" spc="-1" strike="noStrike">
+            <a:endParaRPr lang="en-IN" sz="3200" b="0" strike="noStrike" spc="-1">
               <a:solidFill>
                 <a:srgbClr val="000000"/>
               </a:solidFill>
               <a:uFill>
                 <a:solidFill>
-                  <a:srgbClr val="ffffff"/>
+                  <a:srgbClr val="FFFFFF"/>
                 </a:solidFill>
               </a:uFill>
               <a:latin typeface="Arial"/>
@@ -1307,15 +1459,16 @@
           </a:prstGeom>
         </p:spPr>
         <p:txBody>
-          <a:bodyPr lIns="0" rIns="0" tIns="0" bIns="0"/>
+          <a:bodyPr lIns="0" tIns="0" rIns="0" bIns="0"/>
+          <a:lstStyle/>
           <a:p>
-            <a:endParaRPr b="0" lang="en-IN" sz="3200" spc="-1" strike="noStrike">
+            <a:endParaRPr lang="en-IN" sz="3200" b="0" strike="noStrike" spc="-1">
               <a:solidFill>
                 <a:srgbClr val="000000"/>
               </a:solidFill>
               <a:uFill>
                 <a:solidFill>
-                  <a:srgbClr val="ffffff"/>
+                  <a:srgbClr val="FFFFFF"/>
                 </a:solidFill>
               </a:uFill>
               <a:latin typeface="Arial"/>
@@ -1325,11 +1478,14 @@
       </p:sp>
     </p:spTree>
   </p:cSld>
+  <p:clrMapOvr>
+    <a:masterClrMapping/>
+  </p:clrMapOvr>
 </p:sldLayout>
 </file>
 
 <file path=ppt/slideLayouts/slideLayout9.xml><?xml version="1.0" encoding="utf-8"?>
-<p:sldLayout xmlns:a="http://schemas.openxmlformats.org/drawingml/2006/main" xmlns:p="http://schemas.openxmlformats.org/presentationml/2006/main" xmlns:r="http://schemas.openxmlformats.org/officeDocument/2006/relationships" xmlns:p14="http://schemas.microsoft.com/office/powerpoint/2010/main" xmlns:p15="http://schemas.microsoft.com/office/powerpoint/2012/main" xmlns:mc="http://schemas.openxmlformats.org/markup-compatibility/2006" type="twoObjOverTx" preserve="1">
+<p:sldLayout xmlns:a="http://schemas.openxmlformats.org/drawingml/2006/main" xmlns:r="http://schemas.openxmlformats.org/officeDocument/2006/relationships" xmlns:p="http://schemas.openxmlformats.org/presentationml/2006/main" type="twoObjOverTx" preserve="1">
   <p:cSld name="Title, 2 Content over Content">
     <p:spTree>
       <p:nvGrpSpPr>
@@ -1365,16 +1521,17 @@
           </a:prstGeom>
         </p:spPr>
         <p:txBody>
-          <a:bodyPr lIns="0" rIns="0" tIns="0" bIns="0" anchor="ctr"/>
+          <a:bodyPr lIns="0" tIns="0" rIns="0" bIns="0" anchor="ctr"/>
+          <a:lstStyle/>
           <a:p>
             <a:pPr algn="ctr"/>
-            <a:endParaRPr b="0" lang="en-IN" sz="4400" spc="-1" strike="noStrike">
+            <a:endParaRPr lang="en-IN" sz="4400" b="0" strike="noStrike" spc="-1">
               <a:solidFill>
                 <a:srgbClr val="000000"/>
               </a:solidFill>
               <a:uFill>
                 <a:solidFill>
-                  <a:srgbClr val="ffffff"/>
+                  <a:srgbClr val="FFFFFF"/>
                 </a:solidFill>
               </a:uFill>
               <a:latin typeface="Arial"/>
@@ -1402,15 +1559,16 @@
           </a:prstGeom>
         </p:spPr>
         <p:txBody>
-          <a:bodyPr lIns="0" rIns="0" tIns="0" bIns="0"/>
+          <a:bodyPr lIns="0" tIns="0" rIns="0" bIns="0"/>
+          <a:lstStyle/>
           <a:p>
-            <a:endParaRPr b="0" lang="en-IN" sz="3200" spc="-1" strike="noStrike">
+            <a:endParaRPr lang="en-IN" sz="3200" b="0" strike="noStrike" spc="-1">
               <a:solidFill>
                 <a:srgbClr val="000000"/>
               </a:solidFill>
               <a:uFill>
                 <a:solidFill>
-                  <a:srgbClr val="ffffff"/>
+                  <a:srgbClr val="FFFFFF"/>
                 </a:solidFill>
               </a:uFill>
               <a:latin typeface="Arial"/>
@@ -1438,15 +1596,16 @@
           </a:prstGeom>
         </p:spPr>
         <p:txBody>
-          <a:bodyPr lIns="0" rIns="0" tIns="0" bIns="0"/>
+          <a:bodyPr lIns="0" tIns="0" rIns="0" bIns="0"/>
+          <a:lstStyle/>
           <a:p>
-            <a:endParaRPr b="0" lang="en-IN" sz="3200" spc="-1" strike="noStrike">
+            <a:endParaRPr lang="en-IN" sz="3200" b="0" strike="noStrike" spc="-1">
               <a:solidFill>
                 <a:srgbClr val="000000"/>
               </a:solidFill>
               <a:uFill>
                 <a:solidFill>
-                  <a:srgbClr val="ffffff"/>
+                  <a:srgbClr val="FFFFFF"/>
                 </a:solidFill>
               </a:uFill>
               <a:latin typeface="Arial"/>
@@ -1474,15 +1633,16 @@
           </a:prstGeom>
         </p:spPr>
         <p:txBody>
-          <a:bodyPr lIns="0" rIns="0" tIns="0" bIns="0"/>
+          <a:bodyPr lIns="0" tIns="0" rIns="0" bIns="0"/>
+          <a:lstStyle/>
           <a:p>
-            <a:endParaRPr b="0" lang="en-IN" sz="3200" spc="-1" strike="noStrike">
+            <a:endParaRPr lang="en-IN" sz="3200" b="0" strike="noStrike" spc="-1">
               <a:solidFill>
                 <a:srgbClr val="000000"/>
               </a:solidFill>
               <a:uFill>
                 <a:solidFill>
-                  <a:srgbClr val="ffffff"/>
+                  <a:srgbClr val="FFFFFF"/>
                 </a:solidFill>
               </a:uFill>
               <a:latin typeface="Arial"/>
@@ -1492,11 +1652,702 @@
       </p:sp>
     </p:spTree>
   </p:cSld>
+  <p:clrMapOvr>
+    <a:masterClrMapping/>
+  </p:clrMapOvr>
 </p:sldLayout>
 </file>
 
 <file path=ppt/slideMasters/slideMaster1.xml><?xml version="1.0" encoding="utf-8"?>
-<p:sldMaster xmlns:a="http://schemas.openxmlformats.org/drawingml/2006/main" xmlns:p="http://schemas.openxmlformats.org/presentationml/2006/main" xmlns:r="http://schemas.openxmlformats.org/officeDocument/2006/relationships" xmlns:p14="http://schemas.microsoft.com/office/powerpoint/2010/main" xmlns:p15="http://schemas.microsoft.com/office/powerpoint/2012/main" xmlns:mc="http://schemas.openxmlformats.org/markup-compatibility/2006">
+<p:sldMaster xmlns:a="http://schemas.openxmlformats.org/drawingml/2006/main" xmlns:r="http://schemas.openxmlformats.org/officeDocument/2006/relationships" xmlns:p="http://schemas.openxmlformats.org/presentationml/2006/main">
+  <p:cSld>
+    <p:bg>
+      <p:bgRef idx="1001">
+        <a:schemeClr val="bg1"/>
+      </p:bgRef>
+    </p:bg>
+    <p:spTree>
+      <p:nvGrpSpPr>
+        <p:cNvPr id="1" name=""/>
+        <p:cNvGrpSpPr/>
+        <p:nvPr/>
+      </p:nvGrpSpPr>
+      <p:grpSpPr>
+        <a:xfrm>
+          <a:off x="0" y="0"/>
+          <a:ext cx="0" cy="0"/>
+          <a:chOff x="0" y="0"/>
+          <a:chExt cx="0" cy="0"/>
+        </a:xfrm>
+      </p:grpSpPr>
+      <p:sp>
+        <p:nvSpPr>
+          <p:cNvPr id="5" name="PlaceHolder 1"/>
+          <p:cNvSpPr>
+            <a:spLocks noGrp="1"/>
+          </p:cNvSpPr>
+          <p:nvPr>
+            <p:ph type="title"/>
+          </p:nvPr>
+        </p:nvSpPr>
+        <p:spPr>
+          <a:xfrm>
+            <a:off x="504000" y="301320"/>
+            <a:ext cx="9071640" cy="1262160"/>
+          </a:xfrm>
+          <a:prstGeom prst="rect">
+            <a:avLst/>
+          </a:prstGeom>
+        </p:spPr>
+        <p:txBody>
+          <a:bodyPr lIns="0" tIns="0" rIns="0" bIns="0" anchor="ctr"/>
+          <a:lstStyle/>
+          <a:p>
+            <a:pPr algn="ctr"/>
+            <a:r>
+              <a:rPr lang="en-IN" sz="4400" b="0" strike="noStrike" spc="-1">
+                <a:solidFill>
+                  <a:srgbClr val="000000"/>
+                </a:solidFill>
+                <a:uFill>
+                  <a:solidFill>
+                    <a:srgbClr val="FFFFFF"/>
+                  </a:solidFill>
+                </a:uFill>
+                <a:latin typeface="Arial"/>
+              </a:rPr>
+              <a:t>Click to edit the title text format</a:t>
+            </a:r>
+          </a:p>
+        </p:txBody>
+      </p:sp>
+      <p:sp>
+        <p:nvSpPr>
+          <p:cNvPr id="6" name="PlaceHolder 2"/>
+          <p:cNvSpPr>
+            <a:spLocks noGrp="1"/>
+          </p:cNvSpPr>
+          <p:nvPr>
+            <p:ph type="body"/>
+          </p:nvPr>
+        </p:nvSpPr>
+        <p:spPr>
+          <a:xfrm>
+            <a:off x="504000" y="1769040"/>
+            <a:ext cx="9071640" cy="4384440"/>
+          </a:xfrm>
+          <a:prstGeom prst="rect">
+            <a:avLst/>
+          </a:prstGeom>
+        </p:spPr>
+        <p:txBody>
+          <a:bodyPr lIns="0" tIns="0" rIns="0" bIns="0"/>
+          <a:lstStyle/>
+          <a:p>
+            <a:pPr marL="432000" indent="-324000">
+              <a:buClr>
+                <a:srgbClr val="000000"/>
+              </a:buClr>
+              <a:buSzPct val="45000"/>
+              <a:buFont typeface="Wingdings" charset="2"/>
+              <a:buChar char=""/>
+            </a:pPr>
+            <a:r>
+              <a:rPr lang="en-IN" sz="3200" b="0" strike="noStrike" spc="-1">
+                <a:solidFill>
+                  <a:srgbClr val="000000"/>
+                </a:solidFill>
+                <a:uFill>
+                  <a:solidFill>
+                    <a:srgbClr val="FFFFFF"/>
+                  </a:solidFill>
+                </a:uFill>
+                <a:latin typeface="Arial"/>
+              </a:rPr>
+              <a:t>Click to edit the outline text format</a:t>
+            </a:r>
+          </a:p>
+          <a:p>
+            <a:pPr marL="864000" lvl="1" indent="-324000">
+              <a:buClr>
+                <a:srgbClr val="000000"/>
+              </a:buClr>
+              <a:buSzPct val="75000"/>
+              <a:buFont typeface="Symbol" charset="2"/>
+              <a:buChar char=""/>
+            </a:pPr>
+            <a:r>
+              <a:rPr lang="en-IN" sz="2800" b="0" strike="noStrike" spc="-1">
+                <a:solidFill>
+                  <a:srgbClr val="000000"/>
+                </a:solidFill>
+                <a:uFill>
+                  <a:solidFill>
+                    <a:srgbClr val="FFFFFF"/>
+                  </a:solidFill>
+                </a:uFill>
+                <a:latin typeface="Arial"/>
+              </a:rPr>
+              <a:t>Second Outline Level</a:t>
+            </a:r>
+          </a:p>
+          <a:p>
+            <a:pPr marL="1296000" lvl="2" indent="-288000">
+              <a:buClr>
+                <a:srgbClr val="000000"/>
+              </a:buClr>
+              <a:buSzPct val="45000"/>
+              <a:buFont typeface="Wingdings" charset="2"/>
+              <a:buChar char=""/>
+            </a:pPr>
+            <a:r>
+              <a:rPr lang="en-IN" sz="2400" b="0" strike="noStrike" spc="-1">
+                <a:solidFill>
+                  <a:srgbClr val="000000"/>
+                </a:solidFill>
+                <a:uFill>
+                  <a:solidFill>
+                    <a:srgbClr val="FFFFFF"/>
+                  </a:solidFill>
+                </a:uFill>
+                <a:latin typeface="Arial"/>
+              </a:rPr>
+              <a:t>Third Outline Level</a:t>
+            </a:r>
+          </a:p>
+          <a:p>
+            <a:pPr marL="1728000" lvl="3" indent="-216000">
+              <a:buClr>
+                <a:srgbClr val="000000"/>
+              </a:buClr>
+              <a:buSzPct val="75000"/>
+              <a:buFont typeface="Symbol" charset="2"/>
+              <a:buChar char=""/>
+            </a:pPr>
+            <a:r>
+              <a:rPr lang="en-IN" sz="2000" b="0" strike="noStrike" spc="-1">
+                <a:solidFill>
+                  <a:srgbClr val="000000"/>
+                </a:solidFill>
+                <a:uFill>
+                  <a:solidFill>
+                    <a:srgbClr val="FFFFFF"/>
+                  </a:solidFill>
+                </a:uFill>
+                <a:latin typeface="Arial"/>
+              </a:rPr>
+              <a:t>Fourth Outline Level</a:t>
+            </a:r>
+          </a:p>
+          <a:p>
+            <a:pPr marL="2160000" lvl="4" indent="-216000">
+              <a:buClr>
+                <a:srgbClr val="000000"/>
+              </a:buClr>
+              <a:buSzPct val="45000"/>
+              <a:buFont typeface="Wingdings" charset="2"/>
+              <a:buChar char=""/>
+            </a:pPr>
+            <a:r>
+              <a:rPr lang="en-IN" sz="2000" b="0" strike="noStrike" spc="-1">
+                <a:solidFill>
+                  <a:srgbClr val="000000"/>
+                </a:solidFill>
+                <a:uFill>
+                  <a:solidFill>
+                    <a:srgbClr val="FFFFFF"/>
+                  </a:solidFill>
+                </a:uFill>
+                <a:latin typeface="Arial"/>
+              </a:rPr>
+              <a:t>Fifth Outline Level</a:t>
+            </a:r>
+          </a:p>
+          <a:p>
+            <a:pPr marL="2592000" lvl="5" indent="-216000">
+              <a:buClr>
+                <a:srgbClr val="000000"/>
+              </a:buClr>
+              <a:buSzPct val="45000"/>
+              <a:buFont typeface="Wingdings" charset="2"/>
+              <a:buChar char=""/>
+            </a:pPr>
+            <a:r>
+              <a:rPr lang="en-IN" sz="2000" b="0" strike="noStrike" spc="-1">
+                <a:solidFill>
+                  <a:srgbClr val="000000"/>
+                </a:solidFill>
+                <a:uFill>
+                  <a:solidFill>
+                    <a:srgbClr val="FFFFFF"/>
+                  </a:solidFill>
+                </a:uFill>
+                <a:latin typeface="Arial"/>
+              </a:rPr>
+              <a:t>Sixth Outline Level</a:t>
+            </a:r>
+          </a:p>
+          <a:p>
+            <a:pPr marL="3024000" lvl="6" indent="-216000">
+              <a:buClr>
+                <a:srgbClr val="000000"/>
+              </a:buClr>
+              <a:buSzPct val="45000"/>
+              <a:buFont typeface="Wingdings" charset="2"/>
+              <a:buChar char=""/>
+            </a:pPr>
+            <a:r>
+              <a:rPr lang="en-IN" sz="2000" b="0" strike="noStrike" spc="-1">
+                <a:solidFill>
+                  <a:srgbClr val="000000"/>
+                </a:solidFill>
+                <a:uFill>
+                  <a:solidFill>
+                    <a:srgbClr val="FFFFFF"/>
+                  </a:solidFill>
+                </a:uFill>
+                <a:latin typeface="Arial"/>
+              </a:rPr>
+              <a:t>Seventh Outline Level</a:t>
+            </a:r>
+          </a:p>
+        </p:txBody>
+      </p:sp>
+      <p:sp>
+        <p:nvSpPr>
+          <p:cNvPr id="2" name="PlaceHolder 3"/>
+          <p:cNvSpPr>
+            <a:spLocks noGrp="1"/>
+          </p:cNvSpPr>
+          <p:nvPr>
+            <p:ph type="dt"/>
+          </p:nvPr>
+        </p:nvSpPr>
+        <p:spPr>
+          <a:xfrm>
+            <a:off x="504000" y="6887160"/>
+            <a:ext cx="2348280" cy="521280"/>
+          </a:xfrm>
+          <a:prstGeom prst="rect">
+            <a:avLst/>
+          </a:prstGeom>
+        </p:spPr>
+        <p:txBody>
+          <a:bodyPr lIns="0" tIns="0" rIns="0" bIns="0"/>
+          <a:lstStyle/>
+          <a:p>
+            <a:r>
+              <a:rPr lang="en-IN" sz="1400" b="0" strike="noStrike" spc="-1">
+                <a:solidFill>
+                  <a:srgbClr val="000000"/>
+                </a:solidFill>
+                <a:uFill>
+                  <a:solidFill>
+                    <a:srgbClr val="FFFFFF"/>
+                  </a:solidFill>
+                </a:uFill>
+                <a:latin typeface="Times New Roman"/>
+              </a:rPr>
+              <a:t>&lt;date/time&gt;</a:t>
+            </a:r>
+          </a:p>
+        </p:txBody>
+      </p:sp>
+      <p:sp>
+        <p:nvSpPr>
+          <p:cNvPr id="3" name="PlaceHolder 4"/>
+          <p:cNvSpPr>
+            <a:spLocks noGrp="1"/>
+          </p:cNvSpPr>
+          <p:nvPr>
+            <p:ph type="ftr"/>
+          </p:nvPr>
+        </p:nvSpPr>
+        <p:spPr>
+          <a:xfrm>
+            <a:off x="3447360" y="6887160"/>
+            <a:ext cx="3195000" cy="521280"/>
+          </a:xfrm>
+          <a:prstGeom prst="rect">
+            <a:avLst/>
+          </a:prstGeom>
+        </p:spPr>
+        <p:txBody>
+          <a:bodyPr lIns="0" tIns="0" rIns="0" bIns="0"/>
+          <a:lstStyle/>
+          <a:p>
+            <a:pPr algn="ctr"/>
+            <a:r>
+              <a:rPr lang="en-IN" sz="1400" b="0" strike="noStrike" spc="-1">
+                <a:solidFill>
+                  <a:srgbClr val="000000"/>
+                </a:solidFill>
+                <a:uFill>
+                  <a:solidFill>
+                    <a:srgbClr val="FFFFFF"/>
+                  </a:solidFill>
+                </a:uFill>
+                <a:latin typeface="Times New Roman"/>
+              </a:rPr>
+              <a:t>&lt;footer&gt;</a:t>
+            </a:r>
+          </a:p>
+        </p:txBody>
+      </p:sp>
+      <p:sp>
+        <p:nvSpPr>
+          <p:cNvPr id="4" name="PlaceHolder 5"/>
+          <p:cNvSpPr>
+            <a:spLocks noGrp="1"/>
+          </p:cNvSpPr>
+          <p:nvPr>
+            <p:ph type="sldNum"/>
+          </p:nvPr>
+        </p:nvSpPr>
+        <p:spPr>
+          <a:xfrm>
+            <a:off x="7227360" y="6887160"/>
+            <a:ext cx="2348280" cy="521280"/>
+          </a:xfrm>
+          <a:prstGeom prst="rect">
+            <a:avLst/>
+          </a:prstGeom>
+        </p:spPr>
+        <p:txBody>
+          <a:bodyPr lIns="0" tIns="0" rIns="0" bIns="0"/>
+          <a:lstStyle/>
+          <a:p>
+            <a:pPr algn="r"/>
+            <a:fld id="{079FC2B3-1933-46E3-BA9E-4C274A3CBCC3}" type="slidenum">
+              <a:rPr lang="en-IN" sz="1400" b="0" strike="noStrike" spc="-1">
+                <a:solidFill>
+                  <a:srgbClr val="000000"/>
+                </a:solidFill>
+                <a:uFill>
+                  <a:solidFill>
+                    <a:srgbClr val="FFFFFF"/>
+                  </a:solidFill>
+                </a:uFill>
+                <a:latin typeface="Times New Roman"/>
+              </a:rPr>
+              <a:t>‹#›</a:t>
+            </a:fld>
+            <a:endParaRPr lang="en-IN" sz="1400" b="0" strike="noStrike" spc="-1">
+              <a:solidFill>
+                <a:srgbClr val="000000"/>
+              </a:solidFill>
+              <a:uFill>
+                <a:solidFill>
+                  <a:srgbClr val="FFFFFF"/>
+                </a:solidFill>
+              </a:uFill>
+              <a:latin typeface="Times New Roman"/>
+            </a:endParaRPr>
+          </a:p>
+        </p:txBody>
+      </p:sp>
+    </p:spTree>
+  </p:cSld>
+  <p:clrMap bg1="lt1" tx1="dk1" bg2="lt2" tx2="dk2" accent1="accent1" accent2="accent2" accent3="accent3" accent4="accent4" accent5="accent5" accent6="accent6" hlink="hlink" folHlink="folHlink"/>
+  <p:sldLayoutIdLst>
+    <p:sldLayoutId id="2147483649" r:id="rId1"/>
+    <p:sldLayoutId id="2147483650" r:id="rId2"/>
+    <p:sldLayoutId id="2147483651" r:id="rId3"/>
+    <p:sldLayoutId id="2147483652" r:id="rId4"/>
+    <p:sldLayoutId id="2147483653" r:id="rId5"/>
+    <p:sldLayoutId id="2147483654" r:id="rId6"/>
+    <p:sldLayoutId id="2147483655" r:id="rId7"/>
+    <p:sldLayoutId id="2147483656" r:id="rId8"/>
+    <p:sldLayoutId id="2147483657" r:id="rId9"/>
+    <p:sldLayoutId id="2147483658" r:id="rId10"/>
+    <p:sldLayoutId id="2147483659" r:id="rId11"/>
+    <p:sldLayoutId id="2147483660" r:id="rId12"/>
+  </p:sldLayoutIdLst>
+  <p:txStyles>
+    <p:titleStyle>
+      <a:lvl1pPr algn="l" defTabSz="914400" rtl="0" eaLnBrk="1" latinLnBrk="0" hangingPunct="1">
+        <a:lnSpc>
+          <a:spcPct val="90000"/>
+        </a:lnSpc>
+        <a:spcBef>
+          <a:spcPct val="0"/>
+        </a:spcBef>
+        <a:buNone/>
+        <a:defRPr sz="4400" kern="1200">
+          <a:solidFill>
+            <a:schemeClr val="tx1"/>
+          </a:solidFill>
+          <a:latin typeface="+mj-lt"/>
+          <a:ea typeface="+mj-ea"/>
+          <a:cs typeface="+mj-cs"/>
+        </a:defRPr>
+      </a:lvl1pPr>
+    </p:titleStyle>
+    <p:bodyStyle>
+      <a:lvl1pPr marL="228600" indent="-228600" algn="l" defTabSz="914400" rtl="0" eaLnBrk="1" latinLnBrk="0" hangingPunct="1">
+        <a:lnSpc>
+          <a:spcPct val="90000"/>
+        </a:lnSpc>
+        <a:spcBef>
+          <a:spcPts val="1000"/>
+        </a:spcBef>
+        <a:buFont typeface="Arial" panose="020B0604020202020204" pitchFamily="34" charset="0"/>
+        <a:buChar char="•"/>
+        <a:defRPr sz="2800" kern="1200">
+          <a:solidFill>
+            <a:schemeClr val="tx1"/>
+          </a:solidFill>
+          <a:latin typeface="+mn-lt"/>
+          <a:ea typeface="+mn-ea"/>
+          <a:cs typeface="+mn-cs"/>
+        </a:defRPr>
+      </a:lvl1pPr>
+      <a:lvl2pPr marL="685800" indent="-228600" algn="l" defTabSz="914400" rtl="0" eaLnBrk="1" latinLnBrk="0" hangingPunct="1">
+        <a:lnSpc>
+          <a:spcPct val="90000"/>
+        </a:lnSpc>
+        <a:spcBef>
+          <a:spcPts val="500"/>
+        </a:spcBef>
+        <a:buFont typeface="Arial" panose="020B0604020202020204" pitchFamily="34" charset="0"/>
+        <a:buChar char="•"/>
+        <a:defRPr sz="2400" kern="1200">
+          <a:solidFill>
+            <a:schemeClr val="tx1"/>
+          </a:solidFill>
+          <a:latin typeface="+mn-lt"/>
+          <a:ea typeface="+mn-ea"/>
+          <a:cs typeface="+mn-cs"/>
+        </a:defRPr>
+      </a:lvl2pPr>
+      <a:lvl3pPr marL="1143000" indent="-228600" algn="l" defTabSz="914400" rtl="0" eaLnBrk="1" latinLnBrk="0" hangingPunct="1">
+        <a:lnSpc>
+          <a:spcPct val="90000"/>
+        </a:lnSpc>
+        <a:spcBef>
+          <a:spcPts val="500"/>
+        </a:spcBef>
+        <a:buFont typeface="Arial" panose="020B0604020202020204" pitchFamily="34" charset="0"/>
+        <a:buChar char="•"/>
+        <a:defRPr sz="2000" kern="1200">
+          <a:solidFill>
+            <a:schemeClr val="tx1"/>
+          </a:solidFill>
+          <a:latin typeface="+mn-lt"/>
+          <a:ea typeface="+mn-ea"/>
+          <a:cs typeface="+mn-cs"/>
+        </a:defRPr>
+      </a:lvl3pPr>
+      <a:lvl4pPr marL="1600200" indent="-228600" algn="l" defTabSz="914400" rtl="0" eaLnBrk="1" latinLnBrk="0" hangingPunct="1">
+        <a:lnSpc>
+          <a:spcPct val="90000"/>
+        </a:lnSpc>
+        <a:spcBef>
+          <a:spcPts val="500"/>
+        </a:spcBef>
+        <a:buFont typeface="Arial" panose="020B0604020202020204" pitchFamily="34" charset="0"/>
+        <a:buChar char="•"/>
+        <a:defRPr sz="1800" kern="1200">
+          <a:solidFill>
+            <a:schemeClr val="tx1"/>
+          </a:solidFill>
+          <a:latin typeface="+mn-lt"/>
+          <a:ea typeface="+mn-ea"/>
+          <a:cs typeface="+mn-cs"/>
+        </a:defRPr>
+      </a:lvl4pPr>
+      <a:lvl5pPr marL="2057400" indent="-228600" algn="l" defTabSz="914400" rtl="0" eaLnBrk="1" latinLnBrk="0" hangingPunct="1">
+        <a:lnSpc>
+          <a:spcPct val="90000"/>
+        </a:lnSpc>
+        <a:spcBef>
+          <a:spcPts val="500"/>
+        </a:spcBef>
+        <a:buFont typeface="Arial" panose="020B0604020202020204" pitchFamily="34" charset="0"/>
+        <a:buChar char="•"/>
+        <a:defRPr sz="1800" kern="1200">
+          <a:solidFill>
+            <a:schemeClr val="tx1"/>
+          </a:solidFill>
+          <a:latin typeface="+mn-lt"/>
+          <a:ea typeface="+mn-ea"/>
+          <a:cs typeface="+mn-cs"/>
+        </a:defRPr>
+      </a:lvl5pPr>
+      <a:lvl6pPr marL="2514600" indent="-228600" algn="l" defTabSz="914400" rtl="0" eaLnBrk="1" latinLnBrk="0" hangingPunct="1">
+        <a:lnSpc>
+          <a:spcPct val="90000"/>
+        </a:lnSpc>
+        <a:spcBef>
+          <a:spcPts val="500"/>
+        </a:spcBef>
+        <a:buFont typeface="Arial" panose="020B0604020202020204" pitchFamily="34" charset="0"/>
+        <a:buChar char="•"/>
+        <a:defRPr sz="1800" kern="1200">
+          <a:solidFill>
+            <a:schemeClr val="tx1"/>
+          </a:solidFill>
+          <a:latin typeface="+mn-lt"/>
+          <a:ea typeface="+mn-ea"/>
+          <a:cs typeface="+mn-cs"/>
+        </a:defRPr>
+      </a:lvl6pPr>
+      <a:lvl7pPr marL="2971800" indent="-228600" algn="l" defTabSz="914400" rtl="0" eaLnBrk="1" latinLnBrk="0" hangingPunct="1">
+        <a:lnSpc>
+          <a:spcPct val="90000"/>
+        </a:lnSpc>
+        <a:spcBef>
+          <a:spcPts val="500"/>
+        </a:spcBef>
+        <a:buFont typeface="Arial" panose="020B0604020202020204" pitchFamily="34" charset="0"/>
+        <a:buChar char="•"/>
+        <a:defRPr sz="1800" kern="1200">
+          <a:solidFill>
+            <a:schemeClr val="tx1"/>
+          </a:solidFill>
+          <a:latin typeface="+mn-lt"/>
+          <a:ea typeface="+mn-ea"/>
+          <a:cs typeface="+mn-cs"/>
+        </a:defRPr>
+      </a:lvl7pPr>
+      <a:lvl8pPr marL="3429000" indent="-228600" algn="l" defTabSz="914400" rtl="0" eaLnBrk="1" latinLnBrk="0" hangingPunct="1">
+        <a:lnSpc>
+          <a:spcPct val="90000"/>
+        </a:lnSpc>
+        <a:spcBef>
+          <a:spcPts val="500"/>
+        </a:spcBef>
+        <a:buFont typeface="Arial" panose="020B0604020202020204" pitchFamily="34" charset="0"/>
+        <a:buChar char="•"/>
+        <a:defRPr sz="1800" kern="1200">
+          <a:solidFill>
+            <a:schemeClr val="tx1"/>
+          </a:solidFill>
+          <a:latin typeface="+mn-lt"/>
+          <a:ea typeface="+mn-ea"/>
+          <a:cs typeface="+mn-cs"/>
+        </a:defRPr>
+      </a:lvl8pPr>
+      <a:lvl9pPr marL="3886200" indent="-228600" algn="l" defTabSz="914400" rtl="0" eaLnBrk="1" latinLnBrk="0" hangingPunct="1">
+        <a:lnSpc>
+          <a:spcPct val="90000"/>
+        </a:lnSpc>
+        <a:spcBef>
+          <a:spcPts val="500"/>
+        </a:spcBef>
+        <a:buFont typeface="Arial" panose="020B0604020202020204" pitchFamily="34" charset="0"/>
+        <a:buChar char="•"/>
+        <a:defRPr sz="1800" kern="1200">
+          <a:solidFill>
+            <a:schemeClr val="tx1"/>
+          </a:solidFill>
+          <a:latin typeface="+mn-lt"/>
+          <a:ea typeface="+mn-ea"/>
+          <a:cs typeface="+mn-cs"/>
+        </a:defRPr>
+      </a:lvl9pPr>
+    </p:bodyStyle>
+    <p:otherStyle>
+      <a:defPPr>
+        <a:defRPr lang="en-US"/>
+      </a:defPPr>
+      <a:lvl1pPr marL="0" algn="l" defTabSz="914400" rtl="0" eaLnBrk="1" latinLnBrk="0" hangingPunct="1">
+        <a:defRPr sz="1800" kern="1200">
+          <a:solidFill>
+            <a:schemeClr val="tx1"/>
+          </a:solidFill>
+          <a:latin typeface="+mn-lt"/>
+          <a:ea typeface="+mn-ea"/>
+          <a:cs typeface="+mn-cs"/>
+        </a:defRPr>
+      </a:lvl1pPr>
+      <a:lvl2pPr marL="457200" algn="l" defTabSz="914400" rtl="0" eaLnBrk="1" latinLnBrk="0" hangingPunct="1">
+        <a:defRPr sz="1800" kern="1200">
+          <a:solidFill>
+            <a:schemeClr val="tx1"/>
+          </a:solidFill>
+          <a:latin typeface="+mn-lt"/>
+          <a:ea typeface="+mn-ea"/>
+          <a:cs typeface="+mn-cs"/>
+        </a:defRPr>
+      </a:lvl2pPr>
+      <a:lvl3pPr marL="914400" algn="l" defTabSz="914400" rtl="0" eaLnBrk="1" latinLnBrk="0" hangingPunct="1">
+        <a:defRPr sz="1800" kern="1200">
+          <a:solidFill>
+            <a:schemeClr val="tx1"/>
+          </a:solidFill>
+          <a:latin typeface="+mn-lt"/>
+          <a:ea typeface="+mn-ea"/>
+          <a:cs typeface="+mn-cs"/>
+        </a:defRPr>
+      </a:lvl3pPr>
+      <a:lvl4pPr marL="1371600" algn="l" defTabSz="914400" rtl="0" eaLnBrk="1" latinLnBrk="0" hangingPunct="1">
+        <a:defRPr sz="1800" kern="1200">
+          <a:solidFill>
+            <a:schemeClr val="tx1"/>
+          </a:solidFill>
+          <a:latin typeface="+mn-lt"/>
+          <a:ea typeface="+mn-ea"/>
+          <a:cs typeface="+mn-cs"/>
+        </a:defRPr>
+      </a:lvl4pPr>
+      <a:lvl5pPr marL="1828800" algn="l" defTabSz="914400" rtl="0" eaLnBrk="1" latinLnBrk="0" hangingPunct="1">
+        <a:defRPr sz="1800" kern="1200">
+          <a:solidFill>
+            <a:schemeClr val="tx1"/>
+          </a:solidFill>
+          <a:latin typeface="+mn-lt"/>
+          <a:ea typeface="+mn-ea"/>
+          <a:cs typeface="+mn-cs"/>
+        </a:defRPr>
+      </a:lvl5pPr>
+      <a:lvl6pPr marL="2286000" algn="l" defTabSz="914400" rtl="0" eaLnBrk="1" latinLnBrk="0" hangingPunct="1">
+        <a:defRPr sz="1800" kern="1200">
+          <a:solidFill>
+            <a:schemeClr val="tx1"/>
+          </a:solidFill>
+          <a:latin typeface="+mn-lt"/>
+          <a:ea typeface="+mn-ea"/>
+          <a:cs typeface="+mn-cs"/>
+        </a:defRPr>
+      </a:lvl6pPr>
+      <a:lvl7pPr marL="2743200" algn="l" defTabSz="914400" rtl="0" eaLnBrk="1" latinLnBrk="0" hangingPunct="1">
+        <a:defRPr sz="1800" kern="1200">
+          <a:solidFill>
+            <a:schemeClr val="tx1"/>
+          </a:solidFill>
+          <a:latin typeface="+mn-lt"/>
+          <a:ea typeface="+mn-ea"/>
+          <a:cs typeface="+mn-cs"/>
+        </a:defRPr>
+      </a:lvl7pPr>
+      <a:lvl8pPr marL="3200400" algn="l" defTabSz="914400" rtl="0" eaLnBrk="1" latinLnBrk="0" hangingPunct="1">
+        <a:defRPr sz="1800" kern="1200">
+          <a:solidFill>
+            <a:schemeClr val="tx1"/>
+          </a:solidFill>
+          <a:latin typeface="+mn-lt"/>
+          <a:ea typeface="+mn-ea"/>
+          <a:cs typeface="+mn-cs"/>
+        </a:defRPr>
+      </a:lvl8pPr>
+      <a:lvl9pPr marL="3657600" algn="l" defTabSz="914400" rtl="0" eaLnBrk="1" latinLnBrk="0" hangingPunct="1">
+        <a:defRPr sz="1800" kern="1200">
+          <a:solidFill>
+            <a:schemeClr val="tx1"/>
+          </a:solidFill>
+          <a:latin typeface="+mn-lt"/>
+          <a:ea typeface="+mn-ea"/>
+          <a:cs typeface="+mn-cs"/>
+        </a:defRPr>
+      </a:lvl9pPr>
+    </p:otherStyle>
+  </p:txStyles>
+</p:sldMaster>
+</file>
+
+<file path=ppt/slides/slide1.xml><?xml version="1.0" encoding="utf-8"?>
+<p:sld xmlns:a="http://schemas.openxmlformats.org/drawingml/2006/main" xmlns:r="http://schemas.openxmlformats.org/officeDocument/2006/relationships" xmlns:p="http://schemas.openxmlformats.org/presentationml/2006/main">
   <p:cSld>
     <p:spTree>
       <p:nvGrpSpPr>
@@ -1514,13 +2365,9 @@
       </p:grpSpPr>
       <p:sp>
         <p:nvSpPr>
-          <p:cNvPr id="0" name="PlaceHolder 1"/>
-          <p:cNvSpPr>
-            <a:spLocks noGrp="1"/>
-          </p:cNvSpPr>
-          <p:nvPr>
-            <p:ph type="title"/>
-          </p:nvPr>
+          <p:cNvPr id="39" name="TextShape 1"/>
+          <p:cNvSpPr txBox="1"/>
+          <p:nvPr/>
         </p:nvSpPr>
         <p:spPr>
           <a:xfrm>
@@ -1530,481 +2377,71 @@
           <a:prstGeom prst="rect">
             <a:avLst/>
           </a:prstGeom>
+          <a:noFill/>
+          <a:ln>
+            <a:noFill/>
+          </a:ln>
         </p:spPr>
         <p:txBody>
-          <a:bodyPr lIns="0" rIns="0" tIns="0" bIns="0" anchor="ctr"/>
+          <a:bodyPr lIns="0" tIns="0" rIns="0" bIns="0" anchor="ctr"/>
+          <a:lstStyle/>
           <a:p>
             <a:pPr algn="ctr"/>
             <a:r>
-              <a:rPr b="0" lang="en-IN" sz="4400" spc="-1" strike="noStrike">
+              <a:rPr lang="en-IN" sz="4400" b="0" strike="noStrike" spc="-1">
                 <a:solidFill>
                   <a:srgbClr val="000000"/>
                 </a:solidFill>
                 <a:uFill>
                   <a:solidFill>
-                    <a:srgbClr val="ffffff"/>
+                    <a:srgbClr val="FFFFFF"/>
                   </a:solidFill>
                 </a:uFill>
                 <a:latin typeface="Arial"/>
               </a:rPr>
-              <a:t>Click to edit the title text format</a:t>
+              <a:t>Demo2</a:t>
             </a:r>
-            <a:endParaRPr b="0" lang="en-IN" sz="4400" spc="-1" strike="noStrike">
-              <a:solidFill>
-                <a:srgbClr val="000000"/>
-              </a:solidFill>
-              <a:uFill>
-                <a:solidFill>
-                  <a:srgbClr val="ffffff"/>
-                </a:solidFill>
-              </a:uFill>
-              <a:latin typeface="Arial"/>
-            </a:endParaRPr>
           </a:p>
         </p:txBody>
       </p:sp>
-      <p:sp>
-        <p:nvSpPr>
-          <p:cNvPr id="1" name="PlaceHolder 2"/>
-          <p:cNvSpPr>
-            <a:spLocks noGrp="1"/>
-          </p:cNvSpPr>
-          <p:nvPr>
-            <p:ph type="body"/>
-          </p:nvPr>
-        </p:nvSpPr>
-        <p:spPr>
-          <a:xfrm>
-            <a:off x="504000" y="1769040"/>
-            <a:ext cx="9071640" cy="4384440"/>
-          </a:xfrm>
-          <a:prstGeom prst="rect">
-            <a:avLst/>
-          </a:prstGeom>
-        </p:spPr>
-        <p:txBody>
-          <a:bodyPr lIns="0" rIns="0" tIns="0" bIns="0"/>
-          <a:p>
-            <a:pPr marL="432000" indent="-324000">
-              <a:buClr>
-                <a:srgbClr val="000000"/>
-              </a:buClr>
-              <a:buSzPct val="45000"/>
-              <a:buFont typeface="Wingdings" charset="2"/>
-              <a:buChar char=""/>
-            </a:pPr>
-            <a:r>
-              <a:rPr b="0" lang="en-IN" sz="3200" spc="-1" strike="noStrike">
-                <a:solidFill>
-                  <a:srgbClr val="000000"/>
-                </a:solidFill>
-                <a:uFill>
-                  <a:solidFill>
-                    <a:srgbClr val="ffffff"/>
-                  </a:solidFill>
-                </a:uFill>
-                <a:latin typeface="Arial"/>
-              </a:rPr>
-              <a:t>Click to edit the outline text format</a:t>
-            </a:r>
-            <a:endParaRPr b="0" lang="en-IN" sz="3200" spc="-1" strike="noStrike">
-              <a:solidFill>
-                <a:srgbClr val="000000"/>
-              </a:solidFill>
-              <a:uFill>
-                <a:solidFill>
-                  <a:srgbClr val="ffffff"/>
-                </a:solidFill>
-              </a:uFill>
-              <a:latin typeface="Arial"/>
-            </a:endParaRPr>
-          </a:p>
-          <a:p>
-            <a:pPr lvl="1" marL="864000" indent="-324000">
-              <a:buClr>
-                <a:srgbClr val="000000"/>
-              </a:buClr>
-              <a:buSzPct val="75000"/>
-              <a:buFont typeface="Symbol" charset="2"/>
-              <a:buChar char=""/>
-            </a:pPr>
-            <a:r>
-              <a:rPr b="0" lang="en-IN" sz="2800" spc="-1" strike="noStrike">
-                <a:solidFill>
-                  <a:srgbClr val="000000"/>
-                </a:solidFill>
-                <a:uFill>
-                  <a:solidFill>
-                    <a:srgbClr val="ffffff"/>
-                  </a:solidFill>
-                </a:uFill>
-                <a:latin typeface="Arial"/>
-              </a:rPr>
-              <a:t>Second Outline Level</a:t>
-            </a:r>
-            <a:endParaRPr b="0" lang="en-IN" sz="2800" spc="-1" strike="noStrike">
-              <a:solidFill>
-                <a:srgbClr val="000000"/>
-              </a:solidFill>
-              <a:uFill>
-                <a:solidFill>
-                  <a:srgbClr val="ffffff"/>
-                </a:solidFill>
-              </a:uFill>
-              <a:latin typeface="Arial"/>
-            </a:endParaRPr>
-          </a:p>
-          <a:p>
-            <a:pPr lvl="2" marL="1296000" indent="-288000">
-              <a:buClr>
-                <a:srgbClr val="000000"/>
-              </a:buClr>
-              <a:buSzPct val="45000"/>
-              <a:buFont typeface="Wingdings" charset="2"/>
-              <a:buChar char=""/>
-            </a:pPr>
-            <a:r>
-              <a:rPr b="0" lang="en-IN" sz="2400" spc="-1" strike="noStrike">
-                <a:solidFill>
-                  <a:srgbClr val="000000"/>
-                </a:solidFill>
-                <a:uFill>
-                  <a:solidFill>
-                    <a:srgbClr val="ffffff"/>
-                  </a:solidFill>
-                </a:uFill>
-                <a:latin typeface="Arial"/>
-              </a:rPr>
-              <a:t>Third Outline Level</a:t>
-            </a:r>
-            <a:endParaRPr b="0" lang="en-IN" sz="2400" spc="-1" strike="noStrike">
-              <a:solidFill>
-                <a:srgbClr val="000000"/>
-              </a:solidFill>
-              <a:uFill>
-                <a:solidFill>
-                  <a:srgbClr val="ffffff"/>
-                </a:solidFill>
-              </a:uFill>
-              <a:latin typeface="Arial"/>
-            </a:endParaRPr>
-          </a:p>
-          <a:p>
-            <a:pPr lvl="3" marL="1728000" indent="-216000">
-              <a:buClr>
-                <a:srgbClr val="000000"/>
-              </a:buClr>
-              <a:buSzPct val="75000"/>
-              <a:buFont typeface="Symbol" charset="2"/>
-              <a:buChar char=""/>
-            </a:pPr>
-            <a:r>
-              <a:rPr b="0" lang="en-IN" sz="2000" spc="-1" strike="noStrike">
-                <a:solidFill>
-                  <a:srgbClr val="000000"/>
-                </a:solidFill>
-                <a:uFill>
-                  <a:solidFill>
-                    <a:srgbClr val="ffffff"/>
-                  </a:solidFill>
-                </a:uFill>
-                <a:latin typeface="Arial"/>
-              </a:rPr>
-              <a:t>Fourth Outline Level</a:t>
-            </a:r>
-            <a:endParaRPr b="0" lang="en-IN" sz="2000" spc="-1" strike="noStrike">
-              <a:solidFill>
-                <a:srgbClr val="000000"/>
-              </a:solidFill>
-              <a:uFill>
-                <a:solidFill>
-                  <a:srgbClr val="ffffff"/>
-                </a:solidFill>
-              </a:uFill>
-              <a:latin typeface="Arial"/>
-            </a:endParaRPr>
-          </a:p>
-          <a:p>
-            <a:pPr lvl="4" marL="2160000" indent="-216000">
-              <a:buClr>
-                <a:srgbClr val="000000"/>
-              </a:buClr>
-              <a:buSzPct val="45000"/>
-              <a:buFont typeface="Wingdings" charset="2"/>
-              <a:buChar char=""/>
-            </a:pPr>
-            <a:r>
-              <a:rPr b="0" lang="en-IN" sz="2000" spc="-1" strike="noStrike">
-                <a:solidFill>
-                  <a:srgbClr val="000000"/>
-                </a:solidFill>
-                <a:uFill>
-                  <a:solidFill>
-                    <a:srgbClr val="ffffff"/>
-                  </a:solidFill>
-                </a:uFill>
-                <a:latin typeface="Arial"/>
-              </a:rPr>
-              <a:t>Fifth Outline Level</a:t>
-            </a:r>
-            <a:endParaRPr b="0" lang="en-IN" sz="2000" spc="-1" strike="noStrike">
-              <a:solidFill>
-                <a:srgbClr val="000000"/>
-              </a:solidFill>
-              <a:uFill>
-                <a:solidFill>
-                  <a:srgbClr val="ffffff"/>
-                </a:solidFill>
-              </a:uFill>
-              <a:latin typeface="Arial"/>
-            </a:endParaRPr>
-          </a:p>
-          <a:p>
-            <a:pPr lvl="5" marL="2592000" indent="-216000">
-              <a:buClr>
-                <a:srgbClr val="000000"/>
-              </a:buClr>
-              <a:buSzPct val="45000"/>
-              <a:buFont typeface="Wingdings" charset="2"/>
-              <a:buChar char=""/>
-            </a:pPr>
-            <a:r>
-              <a:rPr b="0" lang="en-IN" sz="2000" spc="-1" strike="noStrike">
-                <a:solidFill>
-                  <a:srgbClr val="000000"/>
-                </a:solidFill>
-                <a:uFill>
-                  <a:solidFill>
-                    <a:srgbClr val="ffffff"/>
-                  </a:solidFill>
-                </a:uFill>
-                <a:latin typeface="Arial"/>
-              </a:rPr>
-              <a:t>Sixth Outline Level</a:t>
-            </a:r>
-            <a:endParaRPr b="0" lang="en-IN" sz="2000" spc="-1" strike="noStrike">
-              <a:solidFill>
-                <a:srgbClr val="000000"/>
-              </a:solidFill>
-              <a:uFill>
-                <a:solidFill>
-                  <a:srgbClr val="ffffff"/>
-                </a:solidFill>
-              </a:uFill>
-              <a:latin typeface="Arial"/>
-            </a:endParaRPr>
-          </a:p>
-          <a:p>
-            <a:pPr lvl="6" marL="3024000" indent="-216000">
-              <a:buClr>
-                <a:srgbClr val="000000"/>
-              </a:buClr>
-              <a:buSzPct val="45000"/>
-              <a:buFont typeface="Wingdings" charset="2"/>
-              <a:buChar char=""/>
-            </a:pPr>
-            <a:r>
-              <a:rPr b="0" lang="en-IN" sz="2000" spc="-1" strike="noStrike">
-                <a:solidFill>
-                  <a:srgbClr val="000000"/>
-                </a:solidFill>
-                <a:uFill>
-                  <a:solidFill>
-                    <a:srgbClr val="ffffff"/>
-                  </a:solidFill>
-                </a:uFill>
-                <a:latin typeface="Arial"/>
-              </a:rPr>
-              <a:t>Seventh Outline Level</a:t>
-            </a:r>
-            <a:endParaRPr b="0" lang="en-IN" sz="2000" spc="-1" strike="noStrike">
-              <a:solidFill>
-                <a:srgbClr val="000000"/>
-              </a:solidFill>
-              <a:uFill>
-                <a:solidFill>
-                  <a:srgbClr val="ffffff"/>
-                </a:solidFill>
-              </a:uFill>
-              <a:latin typeface="Arial"/>
-            </a:endParaRPr>
-          </a:p>
-        </p:txBody>
-      </p:sp>
-      <p:sp>
-        <p:nvSpPr>
-          <p:cNvPr id="2" name="PlaceHolder 3"/>
-          <p:cNvSpPr>
-            <a:spLocks noGrp="1"/>
-          </p:cNvSpPr>
-          <p:nvPr>
-            <p:ph type="dt"/>
-          </p:nvPr>
-        </p:nvSpPr>
-        <p:spPr>
-          <a:xfrm>
-            <a:off x="504000" y="6887160"/>
-            <a:ext cx="2348280" cy="521280"/>
-          </a:xfrm>
-          <a:prstGeom prst="rect">
-            <a:avLst/>
-          </a:prstGeom>
-        </p:spPr>
-        <p:txBody>
-          <a:bodyPr lIns="0" rIns="0" tIns="0" bIns="0"/>
-          <a:p>
-            <a:r>
-              <a:rPr b="0" lang="en-IN" sz="1400" spc="-1" strike="noStrike">
-                <a:solidFill>
-                  <a:srgbClr val="000000"/>
-                </a:solidFill>
-                <a:uFill>
-                  <a:solidFill>
-                    <a:srgbClr val="ffffff"/>
-                  </a:solidFill>
-                </a:uFill>
-                <a:latin typeface="Times New Roman"/>
-              </a:rPr>
-              <a:t>&lt;date/time&gt;</a:t>
-            </a:r>
-            <a:endParaRPr b="0" lang="en-IN" sz="1400" spc="-1" strike="noStrike">
-              <a:solidFill>
-                <a:srgbClr val="000000"/>
-              </a:solidFill>
-              <a:uFill>
-                <a:solidFill>
-                  <a:srgbClr val="ffffff"/>
-                </a:solidFill>
-              </a:uFill>
-              <a:latin typeface="Times New Roman"/>
-            </a:endParaRPr>
-          </a:p>
-        </p:txBody>
-      </p:sp>
-      <p:sp>
-        <p:nvSpPr>
-          <p:cNvPr id="3" name="PlaceHolder 4"/>
-          <p:cNvSpPr>
-            <a:spLocks noGrp="1"/>
-          </p:cNvSpPr>
-          <p:nvPr>
-            <p:ph type="ftr"/>
-          </p:nvPr>
-        </p:nvSpPr>
-        <p:spPr>
-          <a:xfrm>
-            <a:off x="3447360" y="6887160"/>
-            <a:ext cx="3195000" cy="521280"/>
-          </a:xfrm>
-          <a:prstGeom prst="rect">
-            <a:avLst/>
-          </a:prstGeom>
-        </p:spPr>
-        <p:txBody>
-          <a:bodyPr lIns="0" rIns="0" tIns="0" bIns="0"/>
-          <a:p>
-            <a:pPr algn="ctr"/>
-            <a:r>
-              <a:rPr b="0" lang="en-IN" sz="1400" spc="-1" strike="noStrike">
-                <a:solidFill>
-                  <a:srgbClr val="000000"/>
-                </a:solidFill>
-                <a:uFill>
-                  <a:solidFill>
-                    <a:srgbClr val="ffffff"/>
-                  </a:solidFill>
-                </a:uFill>
-                <a:latin typeface="Times New Roman"/>
-              </a:rPr>
-              <a:t>&lt;footer&gt;</a:t>
-            </a:r>
-            <a:endParaRPr b="0" lang="en-IN" sz="1400" spc="-1" strike="noStrike">
-              <a:solidFill>
-                <a:srgbClr val="000000"/>
-              </a:solidFill>
-              <a:uFill>
-                <a:solidFill>
-                  <a:srgbClr val="ffffff"/>
-                </a:solidFill>
-              </a:uFill>
-              <a:latin typeface="Times New Roman"/>
-            </a:endParaRPr>
-          </a:p>
-        </p:txBody>
-      </p:sp>
-      <p:sp>
-        <p:nvSpPr>
-          <p:cNvPr id="4" name="PlaceHolder 5"/>
-          <p:cNvSpPr>
-            <a:spLocks noGrp="1"/>
-          </p:cNvSpPr>
-          <p:nvPr>
-            <p:ph type="sldNum"/>
-          </p:nvPr>
-        </p:nvSpPr>
-        <p:spPr>
-          <a:xfrm>
-            <a:off x="7227360" y="6887160"/>
-            <a:ext cx="2348280" cy="521280"/>
-          </a:xfrm>
-          <a:prstGeom prst="rect">
-            <a:avLst/>
-          </a:prstGeom>
-        </p:spPr>
-        <p:txBody>
-          <a:bodyPr lIns="0" rIns="0" tIns="0" bIns="0"/>
-          <a:p>
-            <a:pPr algn="r"/>
-            <a:fld id="{079FC2B3-1933-46E3-BA9E-4C274A3CBCC3}" type="slidenum">
-              <a:rPr b="0" lang="en-IN" sz="1400" spc="-1" strike="noStrike">
-                <a:solidFill>
-                  <a:srgbClr val="000000"/>
-                </a:solidFill>
-                <a:uFill>
-                  <a:solidFill>
-                    <a:srgbClr val="ffffff"/>
-                  </a:solidFill>
-                </a:uFill>
-                <a:latin typeface="Times New Roman"/>
-              </a:rPr>
-              <a:t>&lt;number&gt;</a:t>
-            </a:fld>
-            <a:endParaRPr b="0" lang="en-IN" sz="1400" spc="-1" strike="noStrike">
-              <a:solidFill>
-                <a:srgbClr val="000000"/>
-              </a:solidFill>
-              <a:uFill>
-                <a:solidFill>
-                  <a:srgbClr val="ffffff"/>
-                </a:solidFill>
-              </a:uFill>
-              <a:latin typeface="Times New Roman"/>
-            </a:endParaRPr>
-          </a:p>
-        </p:txBody>
-      </p:sp>
     </p:spTree>
   </p:cSld>
-  <p:clrMap bg1="lt1" bg2="lt2" tx1="dk1" tx2="dk2" accent1="accent1" accent2="accent2" accent3="accent3" accent4="accent4" accent5="accent5" accent6="accent6" hlink="hlink" folHlink="folHlink"/>
-  <p:sldLayoutIdLst>
-    <p:sldLayoutId id="2147483649" r:id="rId2"/>
-    <p:sldLayoutId id="2147483650" r:id="rId3"/>
-    <p:sldLayoutId id="2147483651" r:id="rId4"/>
-    <p:sldLayoutId id="2147483652" r:id="rId5"/>
-    <p:sldLayoutId id="2147483653" r:id="rId6"/>
-    <p:sldLayoutId id="2147483654" r:id="rId7"/>
-    <p:sldLayoutId id="2147483655" r:id="rId8"/>
-    <p:sldLayoutId id="2147483656" r:id="rId9"/>
-    <p:sldLayoutId id="2147483657" r:id="rId10"/>
-    <p:sldLayoutId id="2147483658" r:id="rId11"/>
-    <p:sldLayoutId id="2147483659" r:id="rId12"/>
-    <p:sldLayoutId id="2147483660" r:id="rId13"/>
-  </p:sldLayoutIdLst>
-</p:sldMaster>
+  <p:clrMapOvr>
+    <a:masterClrMapping/>
+  </p:clrMapOvr>
+  <p:transition spd="slow"/>
+  <p:timing>
+    <p:tnLst>
+      <p:par>
+        <p:cTn id="1" dur="indefinite" restart="never" nodeType="tmRoot">
+          <p:childTnLst>
+            <p:seq>
+              <p:cTn id="2" nodeType="mainSeq"/>
+              <p:prevCondLst>
+                <p:cond evt="onPrev" delay="0">
+                  <p:tgtEl>
+                    <p:sldTgt/>
+                  </p:tgtEl>
+                </p:cond>
+              </p:prevCondLst>
+              <p:nextCondLst>
+                <p:cond evt="onNext" delay="0">
+                  <p:tgtEl>
+                    <p:sldTgt/>
+                  </p:tgtEl>
+                </p:cond>
+              </p:nextCondLst>
+            </p:seq>
+          </p:childTnLst>
+        </p:cTn>
+      </p:par>
+    </p:tnLst>
+  </p:timing>
+</p:sld>
 </file>
 
-<file path=ppt/slides/slide1.xml><?xml version="1.0" encoding="utf-8"?>
-<p:sld xmlns:a="http://schemas.openxmlformats.org/drawingml/2006/main" xmlns:p="http://schemas.openxmlformats.org/presentationml/2006/main" xmlns:r="http://schemas.openxmlformats.org/officeDocument/2006/relationships" xmlns:p14="http://schemas.microsoft.com/office/powerpoint/2010/main" xmlns:p15="http://schemas.microsoft.com/office/powerpoint/2012/main" xmlns:mc="http://schemas.openxmlformats.org/markup-compatibility/2006">
+<file path=ppt/slides/slide10.xml><?xml version="1.0" encoding="utf-8"?>
+<p:sld xmlns:a="http://schemas.openxmlformats.org/drawingml/2006/main" xmlns:r="http://schemas.openxmlformats.org/officeDocument/2006/relationships" xmlns:p="http://schemas.openxmlformats.org/presentationml/2006/main">
   <p:cSld>
     <p:spTree>
       <p:nvGrpSpPr>
@@ -2022,7 +2459,7 @@
       </p:grpSpPr>
       <p:sp>
         <p:nvSpPr>
-          <p:cNvPr id="39" name="TextShape 1"/>
+          <p:cNvPr id="108" name="TextShape 1"/>
           <p:cNvSpPr txBox="1"/>
           <p:nvPr/>
         </p:nvSpPr>
@@ -2040,67 +2477,32 @@
           </a:ln>
         </p:spPr>
         <p:txBody>
-          <a:bodyPr lIns="0" rIns="0" tIns="0" bIns="0" anchor="ctr"/>
+          <a:bodyPr lIns="0" tIns="0" rIns="0" bIns="0" anchor="ctr"/>
+          <a:lstStyle/>
           <a:p>
             <a:pPr algn="ctr"/>
             <a:r>
-              <a:rPr b="0" lang="en-IN" sz="4400" spc="-1" strike="noStrike">
+              <a:rPr lang="en-IN" sz="4400" b="0" strike="noStrike" spc="-1">
                 <a:solidFill>
                   <a:srgbClr val="000000"/>
                 </a:solidFill>
                 <a:uFill>
                   <a:solidFill>
-                    <a:srgbClr val="ffffff"/>
+                    <a:srgbClr val="FFFFFF"/>
                   </a:solidFill>
                 </a:uFill>
                 <a:latin typeface="Arial"/>
               </a:rPr>
-              <a:t>De</a:t>
+              <a:t>Good Job!</a:t>
             </a:r>
-            <a:r>
-              <a:rPr b="0" lang="en-IN" sz="4400" spc="-1" strike="noStrike">
-                <a:solidFill>
-                  <a:srgbClr val="000000"/>
-                </a:solidFill>
-                <a:uFill>
-                  <a:solidFill>
-                    <a:srgbClr val="ffffff"/>
-                  </a:solidFill>
-                </a:uFill>
-                <a:latin typeface="Arial"/>
-              </a:rPr>
-              <a:t>mo</a:t>
-            </a:r>
-            <a:r>
-              <a:rPr b="0" lang="en-IN" sz="4400" spc="-1" strike="noStrike">
-                <a:solidFill>
-                  <a:srgbClr val="000000"/>
-                </a:solidFill>
-                <a:uFill>
-                  <a:solidFill>
-                    <a:srgbClr val="ffffff"/>
-                  </a:solidFill>
-                </a:uFill>
-                <a:latin typeface="Arial"/>
-              </a:rPr>
-              <a:t>2</a:t>
-            </a:r>
-            <a:endParaRPr b="0" lang="en-IN" sz="4400" spc="-1" strike="noStrike">
-              <a:solidFill>
-                <a:srgbClr val="000000"/>
-              </a:solidFill>
-              <a:uFill>
-                <a:solidFill>
-                  <a:srgbClr val="ffffff"/>
-                </a:solidFill>
-              </a:uFill>
-              <a:latin typeface="Arial"/>
-            </a:endParaRPr>
           </a:p>
         </p:txBody>
       </p:sp>
     </p:spTree>
   </p:cSld>
+  <p:clrMapOvr>
+    <a:masterClrMapping/>
+  </p:clrMapOvr>
   <p:timing>
     <p:tnLst>
       <p:par>
@@ -2109,114 +2511,14 @@
             <p:seq>
               <p:cTn id="2" nodeType="mainSeq"/>
               <p:prevCondLst>
-                <p:cond delay="0" evt="onPrev">
+                <p:cond evt="onPrev" delay="0">
                   <p:tgtEl>
                     <p:sldTgt/>
                   </p:tgtEl>
                 </p:cond>
               </p:prevCondLst>
               <p:nextCondLst>
-                <p:cond delay="0" evt="onNext">
-                  <p:tgtEl>
-                    <p:sldTgt/>
-                  </p:tgtEl>
-                </p:cond>
-              </p:nextCondLst>
-            </p:seq>
-          </p:childTnLst>
-        </p:cTn>
-      </p:par>
-    </p:tnLst>
-  </p:timing>
-</p:sld>
-</file>
-
-<file path=ppt/slides/slide10.xml><?xml version="1.0" encoding="utf-8"?>
-<p:sld xmlns:a="http://schemas.openxmlformats.org/drawingml/2006/main" xmlns:p="http://schemas.openxmlformats.org/presentationml/2006/main" xmlns:r="http://schemas.openxmlformats.org/officeDocument/2006/relationships" xmlns:p14="http://schemas.microsoft.com/office/powerpoint/2010/main" xmlns:p15="http://schemas.microsoft.com/office/powerpoint/2012/main" xmlns:mc="http://schemas.openxmlformats.org/markup-compatibility/2006">
-  <p:cSld>
-    <p:spTree>
-      <p:nvGrpSpPr>
-        <p:cNvPr id="1" name=""/>
-        <p:cNvGrpSpPr/>
-        <p:nvPr/>
-      </p:nvGrpSpPr>
-      <p:grpSpPr>
-        <a:xfrm>
-          <a:off x="0" y="0"/>
-          <a:ext cx="0" cy="0"/>
-          <a:chOff x="0" y="0"/>
-          <a:chExt cx="0" cy="0"/>
-        </a:xfrm>
-      </p:grpSpPr>
-      <p:sp>
-        <p:nvSpPr>
-          <p:cNvPr id="108" name="TextShape 1"/>
-          <p:cNvSpPr txBox="1"/>
-          <p:nvPr/>
-        </p:nvSpPr>
-        <p:spPr>
-          <a:xfrm>
-            <a:off x="504000" y="301320"/>
-            <a:ext cx="9071640" cy="1262160"/>
-          </a:xfrm>
-          <a:prstGeom prst="rect">
-            <a:avLst/>
-          </a:prstGeom>
-          <a:noFill/>
-          <a:ln>
-            <a:noFill/>
-          </a:ln>
-        </p:spPr>
-        <p:txBody>
-          <a:bodyPr lIns="0" rIns="0" tIns="0" bIns="0" anchor="ctr"/>
-          <a:p>
-            <a:pPr algn="ctr"/>
-            <a:r>
-              <a:rPr b="0" lang="en-IN" sz="4400" spc="-1" strike="noStrike">
-                <a:solidFill>
-                  <a:srgbClr val="000000"/>
-                </a:solidFill>
-                <a:uFill>
-                  <a:solidFill>
-                    <a:srgbClr val="ffffff"/>
-                  </a:solidFill>
-                </a:uFill>
-                <a:latin typeface="Arial"/>
-              </a:rPr>
-              <a:t>Good Job!</a:t>
-            </a:r>
-            <a:endParaRPr b="0" lang="en-IN" sz="4400" spc="-1" strike="noStrike">
-              <a:solidFill>
-                <a:srgbClr val="000000"/>
-              </a:solidFill>
-              <a:uFill>
-                <a:solidFill>
-                  <a:srgbClr val="ffffff"/>
-                </a:solidFill>
-              </a:uFill>
-              <a:latin typeface="Arial"/>
-            </a:endParaRPr>
-          </a:p>
-        </p:txBody>
-      </p:sp>
-    </p:spTree>
-  </p:cSld>
-  <p:timing>
-    <p:tnLst>
-      <p:par>
-        <p:cTn id="19" dur="indefinite" restart="never" nodeType="tmRoot">
-          <p:childTnLst>
-            <p:seq>
-              <p:cTn id="20" nodeType="mainSeq"/>
-              <p:prevCondLst>
-                <p:cond delay="0" evt="onPrev">
-                  <p:tgtEl>
-                    <p:sldTgt/>
-                  </p:tgtEl>
-                </p:cond>
-              </p:prevCondLst>
-              <p:nextCondLst>
-                <p:cond delay="0" evt="onNext">
+                <p:cond evt="onNext" delay="0">
                   <p:tgtEl>
                     <p:sldTgt/>
                   </p:tgtEl>
@@ -2232,7 +2534,7 @@
 </file>
 
 <file path=ppt/slides/slide2.xml><?xml version="1.0" encoding="utf-8"?>
-<p:sld xmlns:a="http://schemas.openxmlformats.org/drawingml/2006/main" xmlns:p="http://schemas.openxmlformats.org/presentationml/2006/main" xmlns:r="http://schemas.openxmlformats.org/officeDocument/2006/relationships" xmlns:p14="http://schemas.microsoft.com/office/powerpoint/2010/main" xmlns:p15="http://schemas.microsoft.com/office/powerpoint/2012/main" xmlns:mc="http://schemas.openxmlformats.org/markup-compatibility/2006">
+<p:sld xmlns:a="http://schemas.openxmlformats.org/drawingml/2006/main" xmlns:r="http://schemas.openxmlformats.org/officeDocument/2006/relationships" xmlns:p="http://schemas.openxmlformats.org/presentationml/2006/main">
   <p:cSld>
     <p:spTree>
       <p:nvGrpSpPr>
@@ -2250,12 +2552,12 @@
       </p:grpSpPr>
       <p:pic>
         <p:nvPicPr>
-          <p:cNvPr id="40" name="" descr=""/>
+          <p:cNvPr id="40" name="Picture 39"/>
           <p:cNvPicPr/>
           <p:nvPr/>
         </p:nvPicPr>
         <p:blipFill>
-          <a:blip r:embed="rId1"/>
+          <a:blip r:embed="rId2"/>
           <a:srcRect l="9402" t="21398" r="59584" b="8494"/>
           <a:stretch/>
         </p:blipFill>
@@ -2293,20 +2595,26 @@
           </a:ln>
         </p:spPr>
         <p:style>
-          <a:lnRef idx="0"/>
-          <a:fillRef idx="0"/>
-          <a:effectRef idx="0"/>
+          <a:lnRef idx="0">
+            <a:scrgbClr r="0" g="0" b="0"/>
+          </a:lnRef>
+          <a:fillRef idx="0">
+            <a:scrgbClr r="0" g="0" b="0"/>
+          </a:fillRef>
+          <a:effectRef idx="0">
+            <a:scrgbClr r="0" g="0" b="0"/>
+          </a:effectRef>
           <a:fontRef idx="minor"/>
         </p:style>
       </p:sp>
       <p:pic>
         <p:nvPicPr>
-          <p:cNvPr id="42" name="" descr=""/>
+          <p:cNvPr id="42" name="Picture 41"/>
           <p:cNvPicPr/>
           <p:nvPr/>
         </p:nvPicPr>
         <p:blipFill>
-          <a:blip r:embed="rId2"/>
+          <a:blip r:embed="rId3"/>
           <a:srcRect l="51787" t="21398" r="22019" b="10837"/>
           <a:stretch/>
         </p:blipFill>
@@ -2340,15 +2648,21 @@
           <a:noFill/>
           <a:ln w="36000">
             <a:solidFill>
-              <a:srgbClr val="3465a4"/>
+              <a:srgbClr val="3465A4"/>
             </a:solidFill>
             <a:round/>
           </a:ln>
         </p:spPr>
         <p:style>
-          <a:lnRef idx="0"/>
-          <a:fillRef idx="0"/>
-          <a:effectRef idx="0"/>
+          <a:lnRef idx="0">
+            <a:scrgbClr r="0" g="0" b="0"/>
+          </a:lnRef>
+          <a:fillRef idx="0">
+            <a:scrgbClr r="0" g="0" b="0"/>
+          </a:fillRef>
+          <a:effectRef idx="0">
+            <a:scrgbClr r="0" g="0" b="0"/>
+          </a:effectRef>
           <a:fontRef idx="minor"/>
         </p:style>
       </p:sp>
@@ -2369,15 +2683,21 @@
           <a:noFill/>
           <a:ln w="36000">
             <a:solidFill>
-              <a:srgbClr val="3465a4"/>
+              <a:srgbClr val="3465A4"/>
             </a:solidFill>
             <a:round/>
           </a:ln>
         </p:spPr>
         <p:style>
-          <a:lnRef idx="0"/>
-          <a:fillRef idx="0"/>
-          <a:effectRef idx="0"/>
+          <a:lnRef idx="0">
+            <a:scrgbClr r="0" g="0" b="0"/>
+          </a:lnRef>
+          <a:fillRef idx="0">
+            <a:scrgbClr r="0" g="0" b="0"/>
+          </a:fillRef>
+          <a:effectRef idx="0">
+            <a:scrgbClr r="0" g="0" b="0"/>
+          </a:effectRef>
           <a:fontRef idx="minor"/>
         </p:style>
       </p:sp>
@@ -2404,9 +2724,15 @@
           </a:ln>
         </p:spPr>
         <p:style>
-          <a:lnRef idx="0"/>
-          <a:fillRef idx="0"/>
-          <a:effectRef idx="0"/>
+          <a:lnRef idx="0">
+            <a:scrgbClr r="0" g="0" b="0"/>
+          </a:lnRef>
+          <a:fillRef idx="0">
+            <a:scrgbClr r="0" g="0" b="0"/>
+          </a:fillRef>
+          <a:effectRef idx="0">
+            <a:scrgbClr r="0" g="0" b="0"/>
+          </a:effectRef>
           <a:fontRef idx="minor"/>
         </p:style>
       </p:sp>
@@ -2433,9 +2759,15 @@
           </a:ln>
         </p:spPr>
         <p:style>
-          <a:lnRef idx="0"/>
-          <a:fillRef idx="0"/>
-          <a:effectRef idx="0"/>
+          <a:lnRef idx="0">
+            <a:scrgbClr r="0" g="0" b="0"/>
+          </a:lnRef>
+          <a:fillRef idx="0">
+            <a:scrgbClr r="0" g="0" b="0"/>
+          </a:fillRef>
+          <a:effectRef idx="0">
+            <a:scrgbClr r="0" g="0" b="0"/>
+          </a:effectRef>
           <a:fontRef idx="minor"/>
         </p:style>
       </p:sp>
@@ -2457,13 +2789,19 @@
             <a:solidFill>
               <a:srgbClr val="006600"/>
             </a:solidFill>
-            <a:tailEnd len="med" type="triangle" w="med"/>
+            <a:tailEnd type="triangle" w="med" len="med"/>
           </a:ln>
         </p:spPr>
         <p:style>
-          <a:lnRef idx="0"/>
-          <a:fillRef idx="0"/>
-          <a:effectRef idx="0"/>
+          <a:lnRef idx="0">
+            <a:scrgbClr r="0" g="0" b="0"/>
+          </a:lnRef>
+          <a:fillRef idx="0">
+            <a:scrgbClr r="0" g="0" b="0"/>
+          </a:fillRef>
+          <a:effectRef idx="0">
+            <a:scrgbClr r="0" g="0" b="0"/>
+          </a:effectRef>
           <a:fontRef idx="minor"/>
         </p:style>
       </p:sp>
@@ -2482,6 +2820,7 @@
             <a:avLst/>
             <a:gdLst/>
             <a:ahLst/>
+            <a:cxnLst/>
             <a:rect l="0" t="0" r="r" b="b"/>
             <a:pathLst>
               <a:path w="11052" h="1401">
@@ -2507,29 +2846,32 @@
           </a:custGeom>
           <a:ln>
             <a:solidFill>
-              <a:srgbClr val="3333ff"/>
+              <a:srgbClr val="3333FF"/>
             </a:solidFill>
           </a:ln>
         </p:spPr>
       </p:sp>
     </p:spTree>
   </p:cSld>
+  <p:clrMapOvr>
+    <a:masterClrMapping/>
+  </p:clrMapOvr>
   <p:timing>
     <p:tnLst>
       <p:par>
-        <p:cTn id="3" dur="indefinite" restart="never" nodeType="tmRoot">
+        <p:cTn id="1" dur="indefinite" restart="never" nodeType="tmRoot">
           <p:childTnLst>
             <p:seq>
-              <p:cTn id="4" nodeType="mainSeq"/>
+              <p:cTn id="2" nodeType="mainSeq"/>
               <p:prevCondLst>
-                <p:cond delay="0" evt="onPrev">
+                <p:cond evt="onPrev" delay="0">
                   <p:tgtEl>
                     <p:sldTgt/>
                   </p:tgtEl>
                 </p:cond>
               </p:prevCondLst>
               <p:nextCondLst>
-                <p:cond delay="0" evt="onNext">
+                <p:cond evt="onNext" delay="0">
                   <p:tgtEl>
                     <p:sldTgt/>
                   </p:tgtEl>
@@ -2545,7 +2887,7 @@
 </file>
 
 <file path=ppt/slides/slide3.xml><?xml version="1.0" encoding="utf-8"?>
-<p:sld xmlns:a="http://schemas.openxmlformats.org/drawingml/2006/main" xmlns:p="http://schemas.openxmlformats.org/presentationml/2006/main" xmlns:r="http://schemas.openxmlformats.org/officeDocument/2006/relationships" xmlns:p14="http://schemas.microsoft.com/office/powerpoint/2010/main" xmlns:p15="http://schemas.microsoft.com/office/powerpoint/2012/main" xmlns:mc="http://schemas.openxmlformats.org/markup-compatibility/2006">
+<p:sld xmlns:a="http://schemas.openxmlformats.org/drawingml/2006/main" xmlns:r="http://schemas.openxmlformats.org/officeDocument/2006/relationships" xmlns:p="http://schemas.openxmlformats.org/presentationml/2006/main">
   <p:cSld>
     <p:spTree>
       <p:nvGrpSpPr>
@@ -2563,12 +2905,12 @@
       </p:grpSpPr>
       <p:pic>
         <p:nvPicPr>
-          <p:cNvPr id="49" name="" descr=""/>
+          <p:cNvPr id="49" name="Picture 48"/>
           <p:cNvPicPr/>
           <p:nvPr/>
         </p:nvPicPr>
         <p:blipFill>
-          <a:blip r:embed="rId1"/>
+          <a:blip r:embed="rId2"/>
           <a:srcRect l="9402" t="21398" r="59584" b="8494"/>
           <a:stretch/>
         </p:blipFill>
@@ -2606,9 +2948,15 @@
           </a:ln>
         </p:spPr>
         <p:style>
-          <a:lnRef idx="0"/>
-          <a:fillRef idx="0"/>
-          <a:effectRef idx="0"/>
+          <a:lnRef idx="0">
+            <a:scrgbClr r="0" g="0" b="0"/>
+          </a:lnRef>
+          <a:fillRef idx="0">
+            <a:scrgbClr r="0" g="0" b="0"/>
+          </a:fillRef>
+          <a:effectRef idx="0">
+            <a:scrgbClr r="0" g="0" b="0"/>
+          </a:effectRef>
           <a:fontRef idx="minor"/>
         </p:style>
       </p:sp>
@@ -2629,15 +2977,21 @@
           <a:noFill/>
           <a:ln w="36000">
             <a:solidFill>
-              <a:srgbClr val="3465a4"/>
+              <a:srgbClr val="3465A4"/>
             </a:solidFill>
             <a:round/>
           </a:ln>
         </p:spPr>
         <p:style>
-          <a:lnRef idx="0"/>
-          <a:fillRef idx="0"/>
-          <a:effectRef idx="0"/>
+          <a:lnRef idx="0">
+            <a:scrgbClr r="0" g="0" b="0"/>
+          </a:lnRef>
+          <a:fillRef idx="0">
+            <a:scrgbClr r="0" g="0" b="0"/>
+          </a:fillRef>
+          <a:effectRef idx="0">
+            <a:scrgbClr r="0" g="0" b="0"/>
+          </a:effectRef>
           <a:fontRef idx="minor"/>
         </p:style>
       </p:sp>
@@ -2658,15 +3012,21 @@
           <a:noFill/>
           <a:ln w="36000">
             <a:solidFill>
-              <a:srgbClr val="3465a4"/>
+              <a:srgbClr val="3465A4"/>
             </a:solidFill>
             <a:round/>
           </a:ln>
         </p:spPr>
         <p:style>
-          <a:lnRef idx="0"/>
-          <a:fillRef idx="0"/>
-          <a:effectRef idx="0"/>
+          <a:lnRef idx="0">
+            <a:scrgbClr r="0" g="0" b="0"/>
+          </a:lnRef>
+          <a:fillRef idx="0">
+            <a:scrgbClr r="0" g="0" b="0"/>
+          </a:fillRef>
+          <a:effectRef idx="0">
+            <a:scrgbClr r="0" g="0" b="0"/>
+          </a:effectRef>
           <a:fontRef idx="minor"/>
         </p:style>
       </p:sp>
@@ -2693,20 +3053,26 @@
           </a:ln>
         </p:spPr>
         <p:style>
-          <a:lnRef idx="0"/>
-          <a:fillRef idx="0"/>
-          <a:effectRef idx="0"/>
+          <a:lnRef idx="0">
+            <a:scrgbClr r="0" g="0" b="0"/>
+          </a:lnRef>
+          <a:fillRef idx="0">
+            <a:scrgbClr r="0" g="0" b="0"/>
+          </a:fillRef>
+          <a:effectRef idx="0">
+            <a:scrgbClr r="0" g="0" b="0"/>
+          </a:effectRef>
           <a:fontRef idx="minor"/>
         </p:style>
       </p:sp>
       <p:pic>
         <p:nvPicPr>
-          <p:cNvPr id="54" name="" descr=""/>
+          <p:cNvPr id="54" name="Picture 53"/>
           <p:cNvPicPr/>
           <p:nvPr/>
         </p:nvPicPr>
         <p:blipFill>
-          <a:blip r:embed="rId2"/>
+          <a:blip r:embed="rId3"/>
           <a:srcRect l="50697" t="20591" r="22154" b="5714"/>
           <a:stretch/>
         </p:blipFill>
@@ -2738,6 +3104,7 @@
             <a:avLst/>
             <a:gdLst/>
             <a:ahLst/>
+            <a:cxnLst/>
             <a:rect l="0" t="0" r="r" b="b"/>
             <a:pathLst>
               <a:path w="12801" h="1397">
@@ -2763,7 +3130,7 @@
           </a:custGeom>
           <a:ln>
             <a:solidFill>
-              <a:srgbClr val="3333ff"/>
+              <a:srgbClr val="3333FF"/>
             </a:solidFill>
           </a:ln>
         </p:spPr>
@@ -2785,15 +3152,21 @@
           <a:noFill/>
           <a:ln w="36000">
             <a:solidFill>
-              <a:srgbClr val="3465a4"/>
+              <a:srgbClr val="3465A4"/>
             </a:solidFill>
             <a:round/>
           </a:ln>
         </p:spPr>
         <p:style>
-          <a:lnRef idx="0"/>
-          <a:fillRef idx="0"/>
-          <a:effectRef idx="0"/>
+          <a:lnRef idx="0">
+            <a:scrgbClr r="0" g="0" b="0"/>
+          </a:lnRef>
+          <a:fillRef idx="0">
+            <a:scrgbClr r="0" g="0" b="0"/>
+          </a:fillRef>
+          <a:effectRef idx="0">
+            <a:scrgbClr r="0" g="0" b="0"/>
+          </a:effectRef>
           <a:fontRef idx="minor"/>
         </p:style>
       </p:sp>
@@ -2820,9 +3193,15 @@
           </a:ln>
         </p:spPr>
         <p:style>
-          <a:lnRef idx="0"/>
-          <a:fillRef idx="0"/>
-          <a:effectRef idx="0"/>
+          <a:lnRef idx="0">
+            <a:scrgbClr r="0" g="0" b="0"/>
+          </a:lnRef>
+          <a:fillRef idx="0">
+            <a:scrgbClr r="0" g="0" b="0"/>
+          </a:fillRef>
+          <a:effectRef idx="0">
+            <a:scrgbClr r="0" g="0" b="0"/>
+          </a:effectRef>
           <a:fontRef idx="minor"/>
         </p:style>
       </p:sp>
@@ -2844,34 +3223,43 @@
             <a:solidFill>
               <a:srgbClr val="006600"/>
             </a:solidFill>
-            <a:tailEnd len="med" type="triangle" w="med"/>
+            <a:tailEnd type="triangle" w="med" len="med"/>
           </a:ln>
         </p:spPr>
         <p:style>
-          <a:lnRef idx="0"/>
-          <a:fillRef idx="0"/>
-          <a:effectRef idx="0"/>
+          <a:lnRef idx="0">
+            <a:scrgbClr r="0" g="0" b="0"/>
+          </a:lnRef>
+          <a:fillRef idx="0">
+            <a:scrgbClr r="0" g="0" b="0"/>
+          </a:fillRef>
+          <a:effectRef idx="0">
+            <a:scrgbClr r="0" g="0" b="0"/>
+          </a:effectRef>
           <a:fontRef idx="minor"/>
         </p:style>
       </p:sp>
     </p:spTree>
   </p:cSld>
+  <p:clrMapOvr>
+    <a:masterClrMapping/>
+  </p:clrMapOvr>
   <p:timing>
     <p:tnLst>
       <p:par>
-        <p:cTn id="5" dur="indefinite" restart="never" nodeType="tmRoot">
+        <p:cTn id="1" dur="indefinite" restart="never" nodeType="tmRoot">
           <p:childTnLst>
             <p:seq>
-              <p:cTn id="6" nodeType="mainSeq"/>
+              <p:cTn id="2" nodeType="mainSeq"/>
               <p:prevCondLst>
-                <p:cond delay="0" evt="onPrev">
+                <p:cond evt="onPrev" delay="0">
                   <p:tgtEl>
                     <p:sldTgt/>
                   </p:tgtEl>
                 </p:cond>
               </p:prevCondLst>
               <p:nextCondLst>
-                <p:cond delay="0" evt="onNext">
+                <p:cond evt="onNext" delay="0">
                   <p:tgtEl>
                     <p:sldTgt/>
                   </p:tgtEl>
@@ -2887,7 +3275,7 @@
 </file>
 
 <file path=ppt/slides/slide4.xml><?xml version="1.0" encoding="utf-8"?>
-<p:sld xmlns:a="http://schemas.openxmlformats.org/drawingml/2006/main" xmlns:p="http://schemas.openxmlformats.org/presentationml/2006/main" xmlns:r="http://schemas.openxmlformats.org/officeDocument/2006/relationships" xmlns:p14="http://schemas.microsoft.com/office/powerpoint/2010/main" xmlns:p15="http://schemas.microsoft.com/office/powerpoint/2012/main" xmlns:mc="http://schemas.openxmlformats.org/markup-compatibility/2006">
+<p:sld xmlns:a="http://schemas.openxmlformats.org/drawingml/2006/main" xmlns:r="http://schemas.openxmlformats.org/officeDocument/2006/relationships" xmlns:p="http://schemas.openxmlformats.org/presentationml/2006/main">
   <p:cSld>
     <p:spTree>
       <p:nvGrpSpPr>
@@ -2905,12 +3293,12 @@
       </p:grpSpPr>
       <p:pic>
         <p:nvPicPr>
-          <p:cNvPr id="59" name="" descr=""/>
+          <p:cNvPr id="59" name="Picture 58"/>
           <p:cNvPicPr/>
           <p:nvPr/>
         </p:nvPicPr>
         <p:blipFill>
-          <a:blip r:embed="rId1"/>
+          <a:blip r:embed="rId2"/>
           <a:srcRect l="9402" t="39129" r="77940" b="24542"/>
           <a:stretch/>
         </p:blipFill>
@@ -2948,9 +3336,15 @@
           </a:ln>
         </p:spPr>
         <p:style>
-          <a:lnRef idx="0"/>
-          <a:fillRef idx="0"/>
-          <a:effectRef idx="0"/>
+          <a:lnRef idx="0">
+            <a:scrgbClr r="0" g="0" b="0"/>
+          </a:lnRef>
+          <a:fillRef idx="0">
+            <a:scrgbClr r="0" g="0" b="0"/>
+          </a:fillRef>
+          <a:effectRef idx="0">
+            <a:scrgbClr r="0" g="0" b="0"/>
+          </a:effectRef>
           <a:fontRef idx="minor"/>
         </p:style>
       </p:sp>
@@ -2971,15 +3365,21 @@
           <a:noFill/>
           <a:ln w="36000">
             <a:solidFill>
-              <a:srgbClr val="3465a4"/>
+              <a:srgbClr val="3465A4"/>
             </a:solidFill>
             <a:round/>
           </a:ln>
         </p:spPr>
         <p:style>
-          <a:lnRef idx="0"/>
-          <a:fillRef idx="0"/>
-          <a:effectRef idx="0"/>
+          <a:lnRef idx="0">
+            <a:scrgbClr r="0" g="0" b="0"/>
+          </a:lnRef>
+          <a:fillRef idx="0">
+            <a:scrgbClr r="0" g="0" b="0"/>
+          </a:fillRef>
+          <a:effectRef idx="0">
+            <a:scrgbClr r="0" g="0" b="0"/>
+          </a:effectRef>
           <a:fontRef idx="minor"/>
         </p:style>
       </p:sp>
@@ -3006,20 +3406,26 @@
           </a:ln>
         </p:spPr>
         <p:style>
-          <a:lnRef idx="0"/>
-          <a:fillRef idx="0"/>
-          <a:effectRef idx="0"/>
+          <a:lnRef idx="0">
+            <a:scrgbClr r="0" g="0" b="0"/>
+          </a:lnRef>
+          <a:fillRef idx="0">
+            <a:scrgbClr r="0" g="0" b="0"/>
+          </a:fillRef>
+          <a:effectRef idx="0">
+            <a:scrgbClr r="0" g="0" b="0"/>
+          </a:effectRef>
           <a:fontRef idx="minor"/>
         </p:style>
       </p:sp>
       <p:pic>
         <p:nvPicPr>
-          <p:cNvPr id="63" name="" descr=""/>
+          <p:cNvPr id="63" name="Picture 62"/>
           <p:cNvPicPr/>
           <p:nvPr/>
         </p:nvPicPr>
         <p:blipFill>
-          <a:blip r:embed="rId2"/>
+          <a:blip r:embed="rId3"/>
           <a:srcRect l="51082" t="21339" r="26769" b="29104"/>
           <a:stretch/>
         </p:blipFill>
@@ -3059,9 +3465,15 @@
           </a:ln>
         </p:spPr>
         <p:style>
-          <a:lnRef idx="0"/>
-          <a:fillRef idx="0"/>
-          <a:effectRef idx="0"/>
+          <a:lnRef idx="0">
+            <a:scrgbClr r="0" g="0" b="0"/>
+          </a:lnRef>
+          <a:fillRef idx="0">
+            <a:scrgbClr r="0" g="0" b="0"/>
+          </a:fillRef>
+          <a:effectRef idx="0">
+            <a:scrgbClr r="0" g="0" b="0"/>
+          </a:effectRef>
           <a:fontRef idx="minor"/>
         </p:style>
       </p:sp>
@@ -3082,15 +3494,21 @@
           <a:noFill/>
           <a:ln w="36000">
             <a:solidFill>
-              <a:srgbClr val="3465a4"/>
+              <a:srgbClr val="3465A4"/>
             </a:solidFill>
             <a:round/>
           </a:ln>
         </p:spPr>
         <p:style>
-          <a:lnRef idx="0"/>
-          <a:fillRef idx="0"/>
-          <a:effectRef idx="0"/>
+          <a:lnRef idx="0">
+            <a:scrgbClr r="0" g="0" b="0"/>
+          </a:lnRef>
+          <a:fillRef idx="0">
+            <a:scrgbClr r="0" g="0" b="0"/>
+          </a:fillRef>
+          <a:effectRef idx="0">
+            <a:scrgbClr r="0" g="0" b="0"/>
+          </a:effectRef>
           <a:fontRef idx="minor"/>
         </p:style>
       </p:sp>
@@ -3112,13 +3530,19 @@
             <a:solidFill>
               <a:srgbClr val="006600"/>
             </a:solidFill>
-            <a:tailEnd len="med" type="triangle" w="med"/>
+            <a:tailEnd type="triangle" w="med" len="med"/>
           </a:ln>
         </p:spPr>
         <p:style>
-          <a:lnRef idx="0"/>
-          <a:fillRef idx="0"/>
-          <a:effectRef idx="0"/>
+          <a:lnRef idx="0">
+            <a:scrgbClr r="0" g="0" b="0"/>
+          </a:lnRef>
+          <a:fillRef idx="0">
+            <a:scrgbClr r="0" g="0" b="0"/>
+          </a:fillRef>
+          <a:effectRef idx="0">
+            <a:scrgbClr r="0" g="0" b="0"/>
+          </a:effectRef>
           <a:fontRef idx="minor"/>
         </p:style>
       </p:sp>
@@ -3137,6 +3561,7 @@
             <a:avLst/>
             <a:gdLst/>
             <a:ahLst/>
+            <a:cxnLst/>
             <a:rect l="0" t="0" r="r" b="b"/>
             <a:pathLst>
               <a:path w="12402" h="3201">
@@ -3169,22 +3594,25 @@
       </p:sp>
     </p:spTree>
   </p:cSld>
+  <p:clrMapOvr>
+    <a:masterClrMapping/>
+  </p:clrMapOvr>
   <p:timing>
     <p:tnLst>
       <p:par>
-        <p:cTn id="7" dur="indefinite" restart="never" nodeType="tmRoot">
+        <p:cTn id="1" dur="indefinite" restart="never" nodeType="tmRoot">
           <p:childTnLst>
             <p:seq>
-              <p:cTn id="8" nodeType="mainSeq"/>
+              <p:cTn id="2" nodeType="mainSeq"/>
               <p:prevCondLst>
-                <p:cond delay="0" evt="onPrev">
+                <p:cond evt="onPrev" delay="0">
                   <p:tgtEl>
                     <p:sldTgt/>
                   </p:tgtEl>
                 </p:cond>
               </p:prevCondLst>
               <p:nextCondLst>
-                <p:cond delay="0" evt="onNext">
+                <p:cond evt="onNext" delay="0">
                   <p:tgtEl>
                     <p:sldTgt/>
                   </p:tgtEl>
@@ -3200,7 +3628,7 @@
 </file>
 
 <file path=ppt/slides/slide5.xml><?xml version="1.0" encoding="utf-8"?>
-<p:sld xmlns:a="http://schemas.openxmlformats.org/drawingml/2006/main" xmlns:p="http://schemas.openxmlformats.org/presentationml/2006/main" xmlns:r="http://schemas.openxmlformats.org/officeDocument/2006/relationships" xmlns:p14="http://schemas.microsoft.com/office/powerpoint/2010/main" xmlns:p15="http://schemas.microsoft.com/office/powerpoint/2012/main" xmlns:mc="http://schemas.openxmlformats.org/markup-compatibility/2006">
+<p:sld xmlns:a="http://schemas.openxmlformats.org/drawingml/2006/main" xmlns:r="http://schemas.openxmlformats.org/officeDocument/2006/relationships" xmlns:p="http://schemas.openxmlformats.org/presentationml/2006/main">
   <p:cSld>
     <p:spTree>
       <p:nvGrpSpPr>
@@ -3218,12 +3646,12 @@
       </p:grpSpPr>
       <p:pic>
         <p:nvPicPr>
-          <p:cNvPr id="68" name="" descr=""/>
+          <p:cNvPr id="68" name="Picture 67"/>
           <p:cNvPicPr/>
           <p:nvPr/>
         </p:nvPicPr>
         <p:blipFill>
-          <a:blip r:embed="rId1"/>
+          <a:blip r:embed="rId2"/>
           <a:srcRect l="9402" t="45044" r="76039" b="27923"/>
           <a:stretch/>
         </p:blipFill>
@@ -3261,9 +3689,15 @@
           </a:ln>
         </p:spPr>
         <p:style>
-          <a:lnRef idx="0"/>
-          <a:fillRef idx="0"/>
-          <a:effectRef idx="0"/>
+          <a:lnRef idx="0">
+            <a:scrgbClr r="0" g="0" b="0"/>
+          </a:lnRef>
+          <a:fillRef idx="0">
+            <a:scrgbClr r="0" g="0" b="0"/>
+          </a:fillRef>
+          <a:effectRef idx="0">
+            <a:scrgbClr r="0" g="0" b="0"/>
+          </a:effectRef>
           <a:fontRef idx="minor"/>
         </p:style>
       </p:sp>
@@ -3284,26 +3718,32 @@
           <a:noFill/>
           <a:ln w="36000">
             <a:solidFill>
-              <a:srgbClr val="3465a4"/>
+              <a:srgbClr val="3465A4"/>
             </a:solidFill>
             <a:round/>
           </a:ln>
         </p:spPr>
         <p:style>
-          <a:lnRef idx="0"/>
-          <a:fillRef idx="0"/>
-          <a:effectRef idx="0"/>
+          <a:lnRef idx="0">
+            <a:scrgbClr r="0" g="0" b="0"/>
+          </a:lnRef>
+          <a:fillRef idx="0">
+            <a:scrgbClr r="0" g="0" b="0"/>
+          </a:fillRef>
+          <a:effectRef idx="0">
+            <a:scrgbClr r="0" g="0" b="0"/>
+          </a:effectRef>
           <a:fontRef idx="minor"/>
         </p:style>
       </p:sp>
       <p:pic>
         <p:nvPicPr>
-          <p:cNvPr id="71" name="" descr=""/>
+          <p:cNvPr id="71" name="Picture 70"/>
           <p:cNvPicPr/>
           <p:nvPr/>
         </p:nvPicPr>
         <p:blipFill>
-          <a:blip r:embed="rId2"/>
+          <a:blip r:embed="rId3"/>
           <a:srcRect l="51082" t="41339" r="30668" b="29390"/>
           <a:stretch/>
         </p:blipFill>
@@ -3343,9 +3783,15 @@
           </a:ln>
         </p:spPr>
         <p:style>
-          <a:lnRef idx="0"/>
-          <a:fillRef idx="0"/>
-          <a:effectRef idx="0"/>
+          <a:lnRef idx="0">
+            <a:scrgbClr r="0" g="0" b="0"/>
+          </a:lnRef>
+          <a:fillRef idx="0">
+            <a:scrgbClr r="0" g="0" b="0"/>
+          </a:fillRef>
+          <a:effectRef idx="0">
+            <a:scrgbClr r="0" g="0" b="0"/>
+          </a:effectRef>
           <a:fontRef idx="minor"/>
         </p:style>
       </p:sp>
@@ -3367,13 +3813,19 @@
             <a:solidFill>
               <a:srgbClr val="006600"/>
             </a:solidFill>
-            <a:tailEnd len="med" type="triangle" w="med"/>
+            <a:tailEnd type="triangle" w="med" len="med"/>
           </a:ln>
         </p:spPr>
         <p:style>
-          <a:lnRef idx="0"/>
-          <a:fillRef idx="0"/>
-          <a:effectRef idx="0"/>
+          <a:lnRef idx="0">
+            <a:scrgbClr r="0" g="0" b="0"/>
+          </a:lnRef>
+          <a:fillRef idx="0">
+            <a:scrgbClr r="0" g="0" b="0"/>
+          </a:fillRef>
+          <a:effectRef idx="0">
+            <a:scrgbClr r="0" g="0" b="0"/>
+          </a:effectRef>
           <a:fontRef idx="minor"/>
         </p:style>
       </p:sp>
@@ -3400,9 +3852,15 @@
           </a:ln>
         </p:spPr>
         <p:style>
-          <a:lnRef idx="0"/>
-          <a:fillRef idx="0"/>
-          <a:effectRef idx="0"/>
+          <a:lnRef idx="0">
+            <a:scrgbClr r="0" g="0" b="0"/>
+          </a:lnRef>
+          <a:fillRef idx="0">
+            <a:scrgbClr r="0" g="0" b="0"/>
+          </a:fillRef>
+          <a:effectRef idx="0">
+            <a:scrgbClr r="0" g="0" b="0"/>
+          </a:effectRef>
           <a:fontRef idx="minor"/>
         </p:style>
       </p:sp>
@@ -3423,15 +3881,21 @@
           <a:noFill/>
           <a:ln w="36000">
             <a:solidFill>
-              <a:srgbClr val="3465a4"/>
+              <a:srgbClr val="3465A4"/>
             </a:solidFill>
             <a:round/>
           </a:ln>
         </p:spPr>
         <p:style>
-          <a:lnRef idx="0"/>
-          <a:fillRef idx="0"/>
-          <a:effectRef idx="0"/>
+          <a:lnRef idx="0">
+            <a:scrgbClr r="0" g="0" b="0"/>
+          </a:lnRef>
+          <a:fillRef idx="0">
+            <a:scrgbClr r="0" g="0" b="0"/>
+          </a:fillRef>
+          <a:effectRef idx="0">
+            <a:scrgbClr r="0" g="0" b="0"/>
+          </a:effectRef>
           <a:fontRef idx="minor"/>
         </p:style>
       </p:sp>
@@ -3450,6 +3914,7 @@
             <a:avLst/>
             <a:gdLst/>
             <a:ahLst/>
+            <a:cxnLst/>
             <a:rect l="0" t="0" r="r" b="b"/>
             <a:pathLst>
               <a:path w="14401" h="1401">
@@ -3475,29 +3940,32 @@
           </a:custGeom>
           <a:ln>
             <a:solidFill>
-              <a:srgbClr val="3333ff"/>
+              <a:srgbClr val="3333FF"/>
             </a:solidFill>
           </a:ln>
         </p:spPr>
       </p:sp>
     </p:spTree>
   </p:cSld>
+  <p:clrMapOvr>
+    <a:masterClrMapping/>
+  </p:clrMapOvr>
   <p:timing>
     <p:tnLst>
       <p:par>
-        <p:cTn id="9" dur="indefinite" restart="never" nodeType="tmRoot">
+        <p:cTn id="1" dur="indefinite" restart="never" nodeType="tmRoot">
           <p:childTnLst>
             <p:seq>
-              <p:cTn id="10" nodeType="mainSeq"/>
+              <p:cTn id="2" nodeType="mainSeq"/>
               <p:prevCondLst>
-                <p:cond delay="0" evt="onPrev">
+                <p:cond evt="onPrev" delay="0">
                   <p:tgtEl>
                     <p:sldTgt/>
                   </p:tgtEl>
                 </p:cond>
               </p:prevCondLst>
               <p:nextCondLst>
-                <p:cond delay="0" evt="onNext">
+                <p:cond evt="onNext" delay="0">
                   <p:tgtEl>
                     <p:sldTgt/>
                   </p:tgtEl>
@@ -3513,7 +3981,7 @@
 </file>
 
 <file path=ppt/slides/slide6.xml><?xml version="1.0" encoding="utf-8"?>
-<p:sld xmlns:a="http://schemas.openxmlformats.org/drawingml/2006/main" xmlns:p="http://schemas.openxmlformats.org/presentationml/2006/main" xmlns:r="http://schemas.openxmlformats.org/officeDocument/2006/relationships" xmlns:p14="http://schemas.microsoft.com/office/powerpoint/2010/main" xmlns:p15="http://schemas.microsoft.com/office/powerpoint/2012/main" xmlns:mc="http://schemas.openxmlformats.org/markup-compatibility/2006">
+<p:sld xmlns:a="http://schemas.openxmlformats.org/drawingml/2006/main" xmlns:r="http://schemas.openxmlformats.org/officeDocument/2006/relationships" xmlns:p="http://schemas.openxmlformats.org/presentationml/2006/main">
   <p:cSld>
     <p:spTree>
       <p:nvGrpSpPr>
@@ -3531,12 +3999,12 @@
       </p:grpSpPr>
       <p:pic>
         <p:nvPicPr>
-          <p:cNvPr id="77" name="" descr=""/>
+          <p:cNvPr id="77" name="Picture 76"/>
           <p:cNvPicPr/>
           <p:nvPr/>
         </p:nvPicPr>
         <p:blipFill>
-          <a:blip r:embed="rId1"/>
+          <a:blip r:embed="rId2"/>
           <a:srcRect l="9402" t="45891" r="75087" b="17785"/>
           <a:stretch/>
         </p:blipFill>
@@ -3574,20 +4042,26 @@
           </a:ln>
         </p:spPr>
         <p:style>
-          <a:lnRef idx="0"/>
-          <a:fillRef idx="0"/>
-          <a:effectRef idx="0"/>
+          <a:lnRef idx="0">
+            <a:scrgbClr r="0" g="0" b="0"/>
+          </a:lnRef>
+          <a:fillRef idx="0">
+            <a:scrgbClr r="0" g="0" b="0"/>
+          </a:fillRef>
+          <a:effectRef idx="0">
+            <a:scrgbClr r="0" g="0" b="0"/>
+          </a:effectRef>
           <a:fontRef idx="minor"/>
         </p:style>
       </p:sp>
       <p:pic>
         <p:nvPicPr>
-          <p:cNvPr id="79" name="" descr=""/>
+          <p:cNvPr id="79" name="Picture 78"/>
           <p:cNvPicPr/>
           <p:nvPr/>
         </p:nvPicPr>
         <p:blipFill>
-          <a:blip r:embed="rId2"/>
+          <a:blip r:embed="rId3"/>
           <a:srcRect l="51796" t="40394" r="29542" b="18947"/>
           <a:stretch/>
         </p:blipFill>
@@ -3621,15 +4095,21 @@
           <a:noFill/>
           <a:ln w="36000">
             <a:solidFill>
-              <a:srgbClr val="3465a4"/>
+              <a:srgbClr val="3465A4"/>
             </a:solidFill>
             <a:round/>
           </a:ln>
         </p:spPr>
         <p:style>
-          <a:lnRef idx="0"/>
-          <a:fillRef idx="0"/>
-          <a:effectRef idx="0"/>
+          <a:lnRef idx="0">
+            <a:scrgbClr r="0" g="0" b="0"/>
+          </a:lnRef>
+          <a:fillRef idx="0">
+            <a:scrgbClr r="0" g="0" b="0"/>
+          </a:fillRef>
+          <a:effectRef idx="0">
+            <a:scrgbClr r="0" g="0" b="0"/>
+          </a:effectRef>
           <a:fontRef idx="minor"/>
         </p:style>
       </p:sp>
@@ -3656,9 +4136,15 @@
           </a:ln>
         </p:spPr>
         <p:style>
-          <a:lnRef idx="0"/>
-          <a:fillRef idx="0"/>
-          <a:effectRef idx="0"/>
+          <a:lnRef idx="0">
+            <a:scrgbClr r="0" g="0" b="0"/>
+          </a:lnRef>
+          <a:fillRef idx="0">
+            <a:scrgbClr r="0" g="0" b="0"/>
+          </a:fillRef>
+          <a:effectRef idx="0">
+            <a:scrgbClr r="0" g="0" b="0"/>
+          </a:effectRef>
           <a:fontRef idx="minor"/>
         </p:style>
       </p:sp>
@@ -3685,9 +4171,15 @@
           </a:ln>
         </p:spPr>
         <p:style>
-          <a:lnRef idx="0"/>
-          <a:fillRef idx="0"/>
-          <a:effectRef idx="0"/>
+          <a:lnRef idx="0">
+            <a:scrgbClr r="0" g="0" b="0"/>
+          </a:lnRef>
+          <a:fillRef idx="0">
+            <a:scrgbClr r="0" g="0" b="0"/>
+          </a:fillRef>
+          <a:effectRef idx="0">
+            <a:scrgbClr r="0" g="0" b="0"/>
+          </a:effectRef>
           <a:fontRef idx="minor"/>
         </p:style>
       </p:sp>
@@ -3709,13 +4201,19 @@
             <a:solidFill>
               <a:srgbClr val="006600"/>
             </a:solidFill>
-            <a:tailEnd len="med" type="triangle" w="med"/>
+            <a:tailEnd type="triangle" w="med" len="med"/>
           </a:ln>
         </p:spPr>
         <p:style>
-          <a:lnRef idx="0"/>
-          <a:fillRef idx="0"/>
-          <a:effectRef idx="0"/>
+          <a:lnRef idx="0">
+            <a:scrgbClr r="0" g="0" b="0"/>
+          </a:lnRef>
+          <a:fillRef idx="0">
+            <a:scrgbClr r="0" g="0" b="0"/>
+          </a:fillRef>
+          <a:effectRef idx="0">
+            <a:scrgbClr r="0" g="0" b="0"/>
+          </a:effectRef>
           <a:fontRef idx="minor"/>
         </p:style>
       </p:sp>
@@ -3736,15 +4234,21 @@
           <a:noFill/>
           <a:ln w="36000">
             <a:solidFill>
-              <a:srgbClr val="3465a4"/>
+              <a:srgbClr val="3465A4"/>
             </a:solidFill>
             <a:round/>
           </a:ln>
         </p:spPr>
         <p:style>
-          <a:lnRef idx="0"/>
-          <a:fillRef idx="0"/>
-          <a:effectRef idx="0"/>
+          <a:lnRef idx="0">
+            <a:scrgbClr r="0" g="0" b="0"/>
+          </a:lnRef>
+          <a:fillRef idx="0">
+            <a:scrgbClr r="0" g="0" b="0"/>
+          </a:fillRef>
+          <a:effectRef idx="0">
+            <a:scrgbClr r="0" g="0" b="0"/>
+          </a:effectRef>
           <a:fontRef idx="minor"/>
         </p:style>
       </p:sp>
@@ -3763,6 +4267,7 @@
             <a:avLst/>
             <a:gdLst/>
             <a:ahLst/>
+            <a:cxnLst/>
             <a:rect l="0" t="0" r="r" b="b"/>
             <a:pathLst>
               <a:path w="12502" h="1401">
@@ -3788,29 +4293,32 @@
           </a:custGeom>
           <a:ln>
             <a:solidFill>
-              <a:srgbClr val="3333ff"/>
+              <a:srgbClr val="3333FF"/>
             </a:solidFill>
           </a:ln>
         </p:spPr>
       </p:sp>
     </p:spTree>
   </p:cSld>
+  <p:clrMapOvr>
+    <a:masterClrMapping/>
+  </p:clrMapOvr>
   <p:timing>
     <p:tnLst>
       <p:par>
-        <p:cTn id="11" dur="indefinite" restart="never" nodeType="tmRoot">
+        <p:cTn id="1" dur="indefinite" restart="never" nodeType="tmRoot">
           <p:childTnLst>
             <p:seq>
-              <p:cTn id="12" nodeType="mainSeq"/>
+              <p:cTn id="2" nodeType="mainSeq"/>
               <p:prevCondLst>
-                <p:cond delay="0" evt="onPrev">
+                <p:cond evt="onPrev" delay="0">
                   <p:tgtEl>
                     <p:sldTgt/>
                   </p:tgtEl>
                 </p:cond>
               </p:prevCondLst>
               <p:nextCondLst>
-                <p:cond delay="0" evt="onNext">
+                <p:cond evt="onNext" delay="0">
                   <p:tgtEl>
                     <p:sldTgt/>
                   </p:tgtEl>
@@ -3826,7 +4334,7 @@
 </file>
 
 <file path=ppt/slides/slide7.xml><?xml version="1.0" encoding="utf-8"?>
-<p:sld xmlns:a="http://schemas.openxmlformats.org/drawingml/2006/main" xmlns:p="http://schemas.openxmlformats.org/presentationml/2006/main" xmlns:r="http://schemas.openxmlformats.org/officeDocument/2006/relationships" xmlns:p14="http://schemas.microsoft.com/office/powerpoint/2010/main" xmlns:p15="http://schemas.microsoft.com/office/powerpoint/2012/main" xmlns:mc="http://schemas.openxmlformats.org/markup-compatibility/2006">
+<p:sld xmlns:a="http://schemas.openxmlformats.org/drawingml/2006/main" xmlns:r="http://schemas.openxmlformats.org/officeDocument/2006/relationships" xmlns:p="http://schemas.openxmlformats.org/presentationml/2006/main">
   <p:cSld>
     <p:spTree>
       <p:nvGrpSpPr>
@@ -3844,12 +4352,12 @@
       </p:grpSpPr>
       <p:pic>
         <p:nvPicPr>
-          <p:cNvPr id="86" name="" descr=""/>
+          <p:cNvPr id="86" name="Picture 85"/>
           <p:cNvPicPr/>
           <p:nvPr/>
         </p:nvPicPr>
         <p:blipFill>
-          <a:blip r:embed="rId1"/>
+          <a:blip r:embed="rId2"/>
           <a:srcRect l="9875" t="77982" r="59584" b="8494"/>
           <a:stretch/>
         </p:blipFill>
@@ -3887,9 +4395,15 @@
           </a:ln>
         </p:spPr>
         <p:style>
-          <a:lnRef idx="0"/>
-          <a:fillRef idx="0"/>
-          <a:effectRef idx="0"/>
+          <a:lnRef idx="0">
+            <a:scrgbClr r="0" g="0" b="0"/>
+          </a:lnRef>
+          <a:fillRef idx="0">
+            <a:scrgbClr r="0" g="0" b="0"/>
+          </a:fillRef>
+          <a:effectRef idx="0">
+            <a:scrgbClr r="0" g="0" b="0"/>
+          </a:effectRef>
           <a:fontRef idx="minor"/>
         </p:style>
       </p:sp>
@@ -3910,26 +4424,32 @@
           <a:noFill/>
           <a:ln w="36000">
             <a:solidFill>
-              <a:srgbClr val="3465a4"/>
+              <a:srgbClr val="3465A4"/>
             </a:solidFill>
             <a:round/>
           </a:ln>
         </p:spPr>
         <p:style>
-          <a:lnRef idx="0"/>
-          <a:fillRef idx="0"/>
-          <a:effectRef idx="0"/>
+          <a:lnRef idx="0">
+            <a:scrgbClr r="0" g="0" b="0"/>
+          </a:lnRef>
+          <a:fillRef idx="0">
+            <a:scrgbClr r="0" g="0" b="0"/>
+          </a:fillRef>
+          <a:effectRef idx="0">
+            <a:scrgbClr r="0" g="0" b="0"/>
+          </a:effectRef>
           <a:fontRef idx="minor"/>
         </p:style>
       </p:sp>
       <p:pic>
         <p:nvPicPr>
-          <p:cNvPr id="89" name="" descr=""/>
+          <p:cNvPr id="89" name="Picture 88"/>
           <p:cNvPicPr/>
           <p:nvPr/>
         </p:nvPicPr>
         <p:blipFill>
-          <a:blip r:embed="rId2"/>
+          <a:blip r:embed="rId3"/>
           <a:srcRect l="52327" t="69596" r="20525" b="10704"/>
           <a:stretch/>
         </p:blipFill>
@@ -3969,9 +4489,15 @@
           </a:ln>
         </p:spPr>
         <p:style>
-          <a:lnRef idx="0"/>
-          <a:fillRef idx="0"/>
-          <a:effectRef idx="0"/>
+          <a:lnRef idx="0">
+            <a:scrgbClr r="0" g="0" b="0"/>
+          </a:lnRef>
+          <a:fillRef idx="0">
+            <a:scrgbClr r="0" g="0" b="0"/>
+          </a:fillRef>
+          <a:effectRef idx="0">
+            <a:scrgbClr r="0" g="0" b="0"/>
+          </a:effectRef>
           <a:fontRef idx="minor"/>
         </p:style>
       </p:sp>
@@ -3992,15 +4518,21 @@
           <a:noFill/>
           <a:ln w="36000">
             <a:solidFill>
-              <a:srgbClr val="3465a4"/>
+              <a:srgbClr val="3465A4"/>
             </a:solidFill>
             <a:round/>
           </a:ln>
         </p:spPr>
         <p:style>
-          <a:lnRef idx="0"/>
-          <a:fillRef idx="0"/>
-          <a:effectRef idx="0"/>
+          <a:lnRef idx="0">
+            <a:scrgbClr r="0" g="0" b="0"/>
+          </a:lnRef>
+          <a:fillRef idx="0">
+            <a:scrgbClr r="0" g="0" b="0"/>
+          </a:fillRef>
+          <a:effectRef idx="0">
+            <a:scrgbClr r="0" g="0" b="0"/>
+          </a:effectRef>
           <a:fontRef idx="minor"/>
         </p:style>
       </p:sp>
@@ -4027,9 +4559,15 @@
           </a:ln>
         </p:spPr>
         <p:style>
-          <a:lnRef idx="0"/>
-          <a:fillRef idx="0"/>
-          <a:effectRef idx="0"/>
+          <a:lnRef idx="0">
+            <a:scrgbClr r="0" g="0" b="0"/>
+          </a:lnRef>
+          <a:fillRef idx="0">
+            <a:scrgbClr r="0" g="0" b="0"/>
+          </a:fillRef>
+          <a:effectRef idx="0">
+            <a:scrgbClr r="0" g="0" b="0"/>
+          </a:effectRef>
           <a:fontRef idx="minor"/>
         </p:style>
       </p:sp>
@@ -4051,13 +4589,19 @@
             <a:solidFill>
               <a:srgbClr val="006600"/>
             </a:solidFill>
-            <a:tailEnd len="med" type="triangle" w="med"/>
+            <a:tailEnd type="triangle" w="med" len="med"/>
           </a:ln>
         </p:spPr>
         <p:style>
-          <a:lnRef idx="0"/>
-          <a:fillRef idx="0"/>
-          <a:effectRef idx="0"/>
+          <a:lnRef idx="0">
+            <a:scrgbClr r="0" g="0" b="0"/>
+          </a:lnRef>
+          <a:fillRef idx="0">
+            <a:scrgbClr r="0" g="0" b="0"/>
+          </a:fillRef>
+          <a:effectRef idx="0">
+            <a:scrgbClr r="0" g="0" b="0"/>
+          </a:effectRef>
           <a:fontRef idx="minor"/>
         </p:style>
       </p:sp>
@@ -4076,6 +4620,7 @@
             <a:avLst/>
             <a:gdLst/>
             <a:ahLst/>
+            <a:cxnLst/>
             <a:rect l="0" t="0" r="r" b="b"/>
             <a:pathLst>
               <a:path w="12801" h="2201">
@@ -4101,29 +4646,32 @@
           </a:custGeom>
           <a:ln>
             <a:solidFill>
-              <a:srgbClr val="0000cc"/>
+              <a:srgbClr val="0000CC"/>
             </a:solidFill>
           </a:ln>
         </p:spPr>
       </p:sp>
     </p:spTree>
   </p:cSld>
+  <p:clrMapOvr>
+    <a:masterClrMapping/>
+  </p:clrMapOvr>
   <p:timing>
     <p:tnLst>
       <p:par>
-        <p:cTn id="13" dur="indefinite" restart="never" nodeType="tmRoot">
+        <p:cTn id="1" dur="indefinite" restart="never" nodeType="tmRoot">
           <p:childTnLst>
             <p:seq>
-              <p:cTn id="14" nodeType="mainSeq"/>
+              <p:cTn id="2" nodeType="mainSeq"/>
               <p:prevCondLst>
-                <p:cond delay="0" evt="onPrev">
+                <p:cond evt="onPrev" delay="0">
                   <p:tgtEl>
                     <p:sldTgt/>
                   </p:tgtEl>
                 </p:cond>
               </p:prevCondLst>
               <p:nextCondLst>
-                <p:cond delay="0" evt="onNext">
+                <p:cond evt="onNext" delay="0">
                   <p:tgtEl>
                     <p:sldTgt/>
                   </p:tgtEl>
@@ -4139,7 +4687,7 @@
 </file>
 
 <file path=ppt/slides/slide8.xml><?xml version="1.0" encoding="utf-8"?>
-<p:sld xmlns:a="http://schemas.openxmlformats.org/drawingml/2006/main" xmlns:p="http://schemas.openxmlformats.org/presentationml/2006/main" xmlns:r="http://schemas.openxmlformats.org/officeDocument/2006/relationships" xmlns:p14="http://schemas.microsoft.com/office/powerpoint/2010/main" xmlns:p15="http://schemas.microsoft.com/office/powerpoint/2012/main" xmlns:mc="http://schemas.openxmlformats.org/markup-compatibility/2006">
+<p:sld xmlns:a="http://schemas.openxmlformats.org/drawingml/2006/main" xmlns:r="http://schemas.openxmlformats.org/officeDocument/2006/relationships" xmlns:p="http://schemas.openxmlformats.org/presentationml/2006/main">
   <p:cSld>
     <p:spTree>
       <p:nvGrpSpPr>
@@ -4157,12 +4705,12 @@
       </p:grpSpPr>
       <p:pic>
         <p:nvPicPr>
-          <p:cNvPr id="95" name="" descr=""/>
+          <p:cNvPr id="95" name="Picture 94"/>
           <p:cNvPicPr/>
           <p:nvPr/>
         </p:nvPicPr>
         <p:blipFill>
-          <a:blip r:embed="rId1"/>
+          <a:blip r:embed="rId2"/>
           <a:srcRect l="9402" t="65315" r="59584" b="8494"/>
           <a:stretch/>
         </p:blipFill>
@@ -4200,9 +4748,15 @@
           </a:ln>
         </p:spPr>
         <p:style>
-          <a:lnRef idx="0"/>
-          <a:fillRef idx="0"/>
-          <a:effectRef idx="0"/>
+          <a:lnRef idx="0">
+            <a:scrgbClr r="0" g="0" b="0"/>
+          </a:lnRef>
+          <a:fillRef idx="0">
+            <a:scrgbClr r="0" g="0" b="0"/>
+          </a:fillRef>
+          <a:effectRef idx="0">
+            <a:scrgbClr r="0" g="0" b="0"/>
+          </a:effectRef>
           <a:fontRef idx="minor"/>
         </p:style>
       </p:sp>
@@ -4223,15 +4777,21 @@
           <a:noFill/>
           <a:ln w="36000">
             <a:solidFill>
-              <a:srgbClr val="3465a4"/>
+              <a:srgbClr val="3465A4"/>
             </a:solidFill>
             <a:round/>
           </a:ln>
         </p:spPr>
         <p:style>
-          <a:lnRef idx="0"/>
-          <a:fillRef idx="0"/>
-          <a:effectRef idx="0"/>
+          <a:lnRef idx="0">
+            <a:scrgbClr r="0" g="0" b="0"/>
+          </a:lnRef>
+          <a:fillRef idx="0">
+            <a:scrgbClr r="0" g="0" b="0"/>
+          </a:fillRef>
+          <a:effectRef idx="0">
+            <a:scrgbClr r="0" g="0" b="0"/>
+          </a:effectRef>
           <a:fontRef idx="minor"/>
         </p:style>
       </p:sp>
@@ -4258,20 +4818,26 @@
           </a:ln>
         </p:spPr>
         <p:style>
-          <a:lnRef idx="0"/>
-          <a:fillRef idx="0"/>
-          <a:effectRef idx="0"/>
+          <a:lnRef idx="0">
+            <a:scrgbClr r="0" g="0" b="0"/>
+          </a:lnRef>
+          <a:fillRef idx="0">
+            <a:scrgbClr r="0" g="0" b="0"/>
+          </a:fillRef>
+          <a:effectRef idx="0">
+            <a:scrgbClr r="0" g="0" b="0"/>
+          </a:effectRef>
           <a:fontRef idx="minor"/>
         </p:style>
       </p:sp>
       <p:pic>
         <p:nvPicPr>
-          <p:cNvPr id="99" name="" descr=""/>
+          <p:cNvPr id="99" name="Picture 98"/>
           <p:cNvPicPr/>
           <p:nvPr/>
         </p:nvPicPr>
         <p:blipFill>
-          <a:blip r:embed="rId2"/>
+          <a:blip r:embed="rId3"/>
           <a:srcRect l="51796" t="60408" r="27486" b="11339"/>
           <a:stretch/>
         </p:blipFill>
@@ -4305,15 +4871,21 @@
           <a:noFill/>
           <a:ln w="36000">
             <a:solidFill>
-              <a:srgbClr val="3465a4"/>
+              <a:srgbClr val="3465A4"/>
             </a:solidFill>
             <a:round/>
           </a:ln>
         </p:spPr>
         <p:style>
-          <a:lnRef idx="0"/>
-          <a:fillRef idx="0"/>
-          <a:effectRef idx="0"/>
+          <a:lnRef idx="0">
+            <a:scrgbClr r="0" g="0" b="0"/>
+          </a:lnRef>
+          <a:fillRef idx="0">
+            <a:scrgbClr r="0" g="0" b="0"/>
+          </a:fillRef>
+          <a:effectRef idx="0">
+            <a:scrgbClr r="0" g="0" b="0"/>
+          </a:effectRef>
           <a:fontRef idx="minor"/>
         </p:style>
       </p:sp>
@@ -4332,6 +4904,7 @@
             <a:avLst/>
             <a:gdLst/>
             <a:ahLst/>
+            <a:cxnLst/>
             <a:rect l="0" t="0" r="r" b="b"/>
             <a:pathLst>
               <a:path w="12051" h="1401">
@@ -4357,7 +4930,7 @@
           </a:custGeom>
           <a:ln>
             <a:solidFill>
-              <a:srgbClr val="3333ff"/>
+              <a:srgbClr val="3333FF"/>
             </a:solidFill>
           </a:ln>
         </p:spPr>
@@ -4385,9 +4958,15 @@
           </a:ln>
         </p:spPr>
         <p:style>
-          <a:lnRef idx="0"/>
-          <a:fillRef idx="0"/>
-          <a:effectRef idx="0"/>
+          <a:lnRef idx="0">
+            <a:scrgbClr r="0" g="0" b="0"/>
+          </a:lnRef>
+          <a:fillRef idx="0">
+            <a:scrgbClr r="0" g="0" b="0"/>
+          </a:fillRef>
+          <a:effectRef idx="0">
+            <a:scrgbClr r="0" g="0" b="0"/>
+          </a:effectRef>
           <a:fontRef idx="minor"/>
         </p:style>
       </p:sp>
@@ -4409,34 +4988,43 @@
             <a:solidFill>
               <a:srgbClr val="006600"/>
             </a:solidFill>
-            <a:tailEnd len="med" type="triangle" w="med"/>
+            <a:tailEnd type="triangle" w="med" len="med"/>
           </a:ln>
         </p:spPr>
         <p:style>
-          <a:lnRef idx="0"/>
-          <a:fillRef idx="0"/>
-          <a:effectRef idx="0"/>
+          <a:lnRef idx="0">
+            <a:scrgbClr r="0" g="0" b="0"/>
+          </a:lnRef>
+          <a:fillRef idx="0">
+            <a:scrgbClr r="0" g="0" b="0"/>
+          </a:fillRef>
+          <a:effectRef idx="0">
+            <a:scrgbClr r="0" g="0" b="0"/>
+          </a:effectRef>
           <a:fontRef idx="minor"/>
         </p:style>
       </p:sp>
     </p:spTree>
   </p:cSld>
+  <p:clrMapOvr>
+    <a:masterClrMapping/>
+  </p:clrMapOvr>
   <p:timing>
     <p:tnLst>
       <p:par>
-        <p:cTn id="15" dur="indefinite" restart="never" nodeType="tmRoot">
+        <p:cTn id="1" dur="indefinite" restart="never" nodeType="tmRoot">
           <p:childTnLst>
             <p:seq>
-              <p:cTn id="16" nodeType="mainSeq"/>
+              <p:cTn id="2" nodeType="mainSeq"/>
               <p:prevCondLst>
-                <p:cond delay="0" evt="onPrev">
+                <p:cond evt="onPrev" delay="0">
                   <p:tgtEl>
                     <p:sldTgt/>
                   </p:tgtEl>
                 </p:cond>
               </p:prevCondLst>
               <p:nextCondLst>
-                <p:cond delay="0" evt="onNext">
+                <p:cond evt="onNext" delay="0">
                   <p:tgtEl>
                     <p:sldTgt/>
                   </p:tgtEl>
@@ -4452,7 +5040,7 @@
 </file>
 
 <file path=ppt/slides/slide9.xml><?xml version="1.0" encoding="utf-8"?>
-<p:sld xmlns:a="http://schemas.openxmlformats.org/drawingml/2006/main" xmlns:p="http://schemas.openxmlformats.org/presentationml/2006/main" xmlns:r="http://schemas.openxmlformats.org/officeDocument/2006/relationships" xmlns:p14="http://schemas.microsoft.com/office/powerpoint/2010/main" xmlns:p15="http://schemas.microsoft.com/office/powerpoint/2012/main" xmlns:mc="http://schemas.openxmlformats.org/markup-compatibility/2006">
+<p:sld xmlns:a="http://schemas.openxmlformats.org/drawingml/2006/main" xmlns:r="http://schemas.openxmlformats.org/officeDocument/2006/relationships" xmlns:p="http://schemas.openxmlformats.org/presentationml/2006/main">
   <p:cSld>
     <p:spTree>
       <p:nvGrpSpPr>
@@ -4470,13 +5058,13 @@
       </p:grpSpPr>
       <p:pic>
         <p:nvPicPr>
-          <p:cNvPr id="104" name="" descr=""/>
+          <p:cNvPr id="104" name="Picture 103"/>
           <p:cNvPicPr/>
           <p:nvPr/>
         </p:nvPicPr>
         <p:blipFill>
-          <a:blip r:embed="rId1"/>
-          <a:srcRect l="51082" t="21319" r="0" b="4985"/>
+          <a:blip r:embed="rId2"/>
+          <a:srcRect l="51082" t="21319" b="4985"/>
           <a:stretch/>
         </p:blipFill>
         <p:spPr>
@@ -4509,15 +5097,21 @@
           <a:noFill/>
           <a:ln w="36000">
             <a:solidFill>
-              <a:srgbClr val="3465a4"/>
+              <a:srgbClr val="3465A4"/>
             </a:solidFill>
             <a:round/>
           </a:ln>
         </p:spPr>
         <p:style>
-          <a:lnRef idx="0"/>
-          <a:fillRef idx="0"/>
-          <a:effectRef idx="0"/>
+          <a:lnRef idx="0">
+            <a:scrgbClr r="0" g="0" b="0"/>
+          </a:lnRef>
+          <a:fillRef idx="0">
+            <a:scrgbClr r="0" g="0" b="0"/>
+          </a:fillRef>
+          <a:effectRef idx="0">
+            <a:scrgbClr r="0" g="0" b="0"/>
+          </a:effectRef>
           <a:fontRef idx="minor"/>
         </p:style>
       </p:sp>
@@ -4541,42 +5135,32 @@
           </a:ln>
         </p:spPr>
         <p:txBody>
-          <a:bodyPr lIns="90000" rIns="90000" tIns="45000" bIns="45000"/>
+          <a:bodyPr lIns="90000" tIns="45000" rIns="90000" bIns="45000"/>
+          <a:lstStyle/>
           <a:p>
             <a:r>
-              <a:rPr b="0" lang="en-IN" sz="1800" spc="-1" strike="noStrike">
+              <a:rPr lang="en-IN" sz="1800" b="0" strike="noStrike" spc="-1">
                 <a:solidFill>
                   <a:srgbClr val="000000"/>
                 </a:solidFill>
                 <a:uFill>
                   <a:solidFill>
-                    <a:srgbClr val="ffffff"/>
+                    <a:srgbClr val="FFFFFF"/>
                   </a:solidFill>
                 </a:uFill>
                 <a:latin typeface="Arial"/>
               </a:rPr>
               <a:t>CLICK HERE</a:t>
             </a:r>
-            <a:endParaRPr b="0" lang="en-IN" sz="1800" spc="-1" strike="noStrike">
+          </a:p>
+          <a:p>
+            <a:endParaRPr lang="en-IN" sz="1800" b="0" strike="noStrike" spc="-1">
               <a:solidFill>
                 <a:srgbClr val="000000"/>
               </a:solidFill>
               <a:uFill>
                 <a:solidFill>
-                  <a:srgbClr val="ffffff"/>
-                </a:solidFill>
-              </a:uFill>
-              <a:latin typeface="Arial"/>
-            </a:endParaRPr>
-          </a:p>
-          <a:p>
-            <a:endParaRPr b="0" lang="en-IN" sz="1800" spc="-1" strike="noStrike">
-              <a:solidFill>
-                <a:srgbClr val="000000"/>
-              </a:solidFill>
-              <a:uFill>
-                <a:solidFill>
-                  <a:srgbClr val="ffffff"/>
+                  <a:srgbClr val="FFFFFF"/>
                 </a:solidFill>
               </a:uFill>
               <a:latin typeface="Arial"/>
@@ -4600,36 +5184,45 @@
           </a:prstGeom>
           <a:ln>
             <a:solidFill>
-              <a:srgbClr val="0000cc"/>
+              <a:srgbClr val="0000CC"/>
             </a:solidFill>
-            <a:tailEnd len="med" type="triangle" w="med"/>
+            <a:tailEnd type="triangle" w="med" len="med"/>
           </a:ln>
         </p:spPr>
         <p:style>
-          <a:lnRef idx="0"/>
-          <a:fillRef idx="0"/>
-          <a:effectRef idx="0"/>
+          <a:lnRef idx="0">
+            <a:scrgbClr r="0" g="0" b="0"/>
+          </a:lnRef>
+          <a:fillRef idx="0">
+            <a:scrgbClr r="0" g="0" b="0"/>
+          </a:fillRef>
+          <a:effectRef idx="0">
+            <a:scrgbClr r="0" g="0" b="0"/>
+          </a:effectRef>
           <a:fontRef idx="minor"/>
         </p:style>
       </p:sp>
     </p:spTree>
   </p:cSld>
+  <p:clrMapOvr>
+    <a:masterClrMapping/>
+  </p:clrMapOvr>
   <p:timing>
     <p:tnLst>
       <p:par>
-        <p:cTn id="17" dur="indefinite" restart="never" nodeType="tmRoot">
+        <p:cTn id="1" dur="indefinite" restart="never" nodeType="tmRoot">
           <p:childTnLst>
             <p:seq>
-              <p:cTn id="18" nodeType="mainSeq"/>
+              <p:cTn id="2" nodeType="mainSeq"/>
               <p:prevCondLst>
-                <p:cond delay="0" evt="onPrev">
+                <p:cond evt="onPrev" delay="0">
                   <p:tgtEl>
                     <p:sldTgt/>
                   </p:tgtEl>
                 </p:cond>
               </p:prevCondLst>
               <p:nextCondLst>
-                <p:cond delay="0" evt="onNext">
+                <p:cond evt="onNext" delay="0">
                   <p:tgtEl>
                     <p:sldTgt/>
                   </p:tgtEl>
@@ -4864,5 +5457,7 @@
       </a:bgFillStyleLst>
     </a:fmtScheme>
   </a:themeElements>
+  <a:objectDefaults/>
+  <a:extraClrSchemeLst/>
 </a:theme>
 </file>
</xml_diff>